<commit_message>
updates for .net core
</commit_message>
<xml_diff>
--- a/aspnet5/slides/01_Overview.pptx
+++ b/aspnet5/slides/01_Overview.pptx
@@ -5,10 +5,10 @@
     <p:sldMasterId id="2147483772" r:id="rId1"/>
   </p:sldMasterIdLst>
   <p:notesMasterIdLst>
-    <p:notesMasterId r:id="rId25"/>
+    <p:notesMasterId r:id="rId21"/>
   </p:notesMasterIdLst>
   <p:handoutMasterIdLst>
-    <p:handoutMasterId r:id="rId26"/>
+    <p:handoutMasterId r:id="rId22"/>
   </p:handoutMasterIdLst>
   <p:sldIdLst>
     <p:sldId id="327" r:id="rId2"/>
@@ -20,20 +20,16 @@
     <p:sldId id="337" r:id="rId8"/>
     <p:sldId id="333" r:id="rId9"/>
     <p:sldId id="334" r:id="rId10"/>
-    <p:sldId id="332" r:id="rId11"/>
-    <p:sldId id="335" r:id="rId12"/>
-    <p:sldId id="336" r:id="rId13"/>
-    <p:sldId id="338" r:id="rId14"/>
-    <p:sldId id="339" r:id="rId15"/>
-    <p:sldId id="340" r:id="rId16"/>
-    <p:sldId id="349" r:id="rId17"/>
-    <p:sldId id="341" r:id="rId18"/>
-    <p:sldId id="342" r:id="rId19"/>
-    <p:sldId id="343" r:id="rId20"/>
-    <p:sldId id="344" r:id="rId21"/>
-    <p:sldId id="345" r:id="rId22"/>
-    <p:sldId id="346" r:id="rId23"/>
-    <p:sldId id="347" r:id="rId24"/>
+    <p:sldId id="335" r:id="rId11"/>
+    <p:sldId id="336" r:id="rId12"/>
+    <p:sldId id="338" r:id="rId13"/>
+    <p:sldId id="340" r:id="rId14"/>
+    <p:sldId id="342" r:id="rId15"/>
+    <p:sldId id="343" r:id="rId16"/>
+    <p:sldId id="344" r:id="rId17"/>
+    <p:sldId id="345" r:id="rId18"/>
+    <p:sldId id="346" r:id="rId19"/>
+    <p:sldId id="347" r:id="rId20"/>
   </p:sldIdLst>
   <p:sldSz cx="9144000" cy="6858000" type="screen4x3"/>
   <p:notesSz cx="7302500" cy="9588500"/>
@@ -176,14 +172,10 @@
             <p14:sldId id="337"/>
             <p14:sldId id="333"/>
             <p14:sldId id="334"/>
-            <p14:sldId id="332"/>
             <p14:sldId id="335"/>
             <p14:sldId id="336"/>
             <p14:sldId id="338"/>
-            <p14:sldId id="339"/>
             <p14:sldId id="340"/>
-            <p14:sldId id="349"/>
-            <p14:sldId id="341"/>
             <p14:sldId id="342"/>
             <p14:sldId id="343"/>
             <p14:sldId id="344"/>
@@ -317,7 +309,7 @@
               <a:pPr>
                 <a:defRPr/>
               </a:pPr>
-              <a:t>5/2/2016</a:t>
+              <a:t>2/21/2017</a:t>
             </a:fld>
             <a:endParaRPr lang="en-US"/>
           </a:p>
@@ -1209,7 +1201,7 @@
               <a:pPr>
                 <a:defRPr/>
               </a:pPr>
-              <a:t>11</a:t>
+              <a:t>10</a:t>
             </a:fld>
             <a:endParaRPr lang="en-US"/>
           </a:p>
@@ -1299,7 +1291,7 @@
               <a:pPr>
                 <a:defRPr/>
               </a:pPr>
-              <a:t>14</a:t>
+              <a:t>11</a:t>
             </a:fld>
             <a:endParaRPr lang="en-US"/>
           </a:p>
@@ -1308,7 +1300,7 @@
     </p:spTree>
     <p:extLst>
       <p:ext uri="{BB962C8B-B14F-4D97-AF65-F5344CB8AC3E}">
-        <p14:creationId xmlns:p14="http://schemas.microsoft.com/office/powerpoint/2010/main" val="374624918"/>
+        <p14:creationId xmlns:p14="http://schemas.microsoft.com/office/powerpoint/2010/main" val="907013250"/>
       </p:ext>
     </p:extLst>
   </p:cSld>
@@ -1389,7 +1381,7 @@
               <a:pPr>
                 <a:defRPr/>
               </a:pPr>
-              <a:t>17</a:t>
+              <a:t>14</a:t>
             </a:fld>
             <a:endParaRPr lang="en-US"/>
           </a:p>
@@ -1398,7 +1390,7 @@
     </p:spTree>
     <p:extLst>
       <p:ext uri="{BB962C8B-B14F-4D97-AF65-F5344CB8AC3E}">
-        <p14:creationId xmlns:p14="http://schemas.microsoft.com/office/powerpoint/2010/main" val="1500199805"/>
+        <p14:creationId xmlns:p14="http://schemas.microsoft.com/office/powerpoint/2010/main" val="3112602916"/>
       </p:ext>
     </p:extLst>
   </p:cSld>
@@ -1452,7 +1444,7 @@
           <a:bodyPr/>
           <a:lstStyle/>
           <a:p>
-            <a:endParaRPr lang="en-US" dirty="0"/>
+            <a:endParaRPr lang="en-US"/>
           </a:p>
         </p:txBody>
       </p:sp>
@@ -1479,97 +1471,7 @@
               <a:pPr>
                 <a:defRPr/>
               </a:pPr>
-              <a:t>18</a:t>
-            </a:fld>
-            <a:endParaRPr lang="en-US"/>
-          </a:p>
-        </p:txBody>
-      </p:sp>
-    </p:spTree>
-    <p:extLst>
-      <p:ext uri="{BB962C8B-B14F-4D97-AF65-F5344CB8AC3E}">
-        <p14:creationId xmlns:p14="http://schemas.microsoft.com/office/powerpoint/2010/main" val="3112602916"/>
-      </p:ext>
-    </p:extLst>
-  </p:cSld>
-  <p:clrMapOvr>
-    <a:masterClrMapping/>
-  </p:clrMapOvr>
-</p:notes>
-</file>
-
-<file path=ppt/notesSlides/notesSlide8.xml><?xml version="1.0" encoding="utf-8"?>
-<p:notes xmlns:a="http://schemas.openxmlformats.org/drawingml/2006/main" xmlns:r="http://schemas.openxmlformats.org/officeDocument/2006/relationships" xmlns:p="http://schemas.openxmlformats.org/presentationml/2006/main">
-  <p:cSld>
-    <p:spTree>
-      <p:nvGrpSpPr>
-        <p:cNvPr id="1" name=""/>
-        <p:cNvGrpSpPr/>
-        <p:nvPr/>
-      </p:nvGrpSpPr>
-      <p:grpSpPr>
-        <a:xfrm>
-          <a:off x="0" y="0"/>
-          <a:ext cx="0" cy="0"/>
-          <a:chOff x="0" y="0"/>
-          <a:chExt cx="0" cy="0"/>
-        </a:xfrm>
-      </p:grpSpPr>
-      <p:sp>
-        <p:nvSpPr>
-          <p:cNvPr id="2" name="Slide Image Placeholder 1"/>
-          <p:cNvSpPr>
-            <a:spLocks noGrp="1" noRot="1" noChangeAspect="1"/>
-          </p:cNvSpPr>
-          <p:nvPr>
-            <p:ph type="sldImg"/>
-          </p:nvPr>
-        </p:nvSpPr>
-        <p:spPr/>
-      </p:sp>
-      <p:sp>
-        <p:nvSpPr>
-          <p:cNvPr id="3" name="Notes Placeholder 2"/>
-          <p:cNvSpPr>
-            <a:spLocks noGrp="1"/>
-          </p:cNvSpPr>
-          <p:nvPr>
-            <p:ph type="body" idx="1"/>
-          </p:nvPr>
-        </p:nvSpPr>
-        <p:spPr/>
-        <p:txBody>
-          <a:bodyPr/>
-          <a:lstStyle/>
-          <a:p>
-            <a:endParaRPr lang="en-US"/>
-          </a:p>
-        </p:txBody>
-      </p:sp>
-      <p:sp>
-        <p:nvSpPr>
-          <p:cNvPr id="4" name="Slide Number Placeholder 3"/>
-          <p:cNvSpPr>
-            <a:spLocks noGrp="1"/>
-          </p:cNvSpPr>
-          <p:nvPr>
-            <p:ph type="sldNum" sz="quarter" idx="10"/>
-          </p:nvPr>
-        </p:nvSpPr>
-        <p:spPr/>
-        <p:txBody>
-          <a:bodyPr/>
-          <a:lstStyle/>
-          <a:p>
-            <a:pPr>
-              <a:defRPr/>
-            </a:pPr>
-            <a:fld id="{11D29CD3-EA91-4B07-8041-33A63E8C46BA}" type="slidenum">
-              <a:rPr lang="en-US" smtClean="0"/>
-              <a:pPr>
-                <a:defRPr/>
-              </a:pPr>
-              <a:t>23</a:t>
+              <a:t>19</a:t>
             </a:fld>
             <a:endParaRPr lang="en-US"/>
           </a:p>
@@ -3481,147 +3383,6 @@
           <a:p>
             <a:r>
               <a:rPr lang="en-US" dirty="0"/>
-              <a:t>The </a:t>
-            </a:r>
-            <a:r>
-              <a:rPr lang="en-US" dirty="0" err="1"/>
-              <a:t>project.json</a:t>
-            </a:r>
-            <a:endParaRPr lang="en-US" dirty="0"/>
-          </a:p>
-        </p:txBody>
-      </p:sp>
-      <p:sp>
-        <p:nvSpPr>
-          <p:cNvPr id="3" name="Text Placeholder 2"/>
-          <p:cNvSpPr>
-            <a:spLocks noGrp="1"/>
-          </p:cNvSpPr>
-          <p:nvPr>
-            <p:ph type="body" idx="1"/>
-          </p:nvPr>
-        </p:nvSpPr>
-        <p:spPr/>
-        <p:txBody>
-          <a:bodyPr/>
-          <a:lstStyle/>
-          <a:p>
-            <a:r>
-              <a:rPr lang="en-US" dirty="0" err="1"/>
-              <a:t>project.json</a:t>
-            </a:r>
-            <a:r>
-              <a:rPr lang="en-US" dirty="0"/>
-              <a:t> is the heart of the project</a:t>
-            </a:r>
-          </a:p>
-          <a:p>
-            <a:pPr lvl="1"/>
-            <a:r>
-              <a:rPr lang="en-US" dirty="0"/>
-              <a:t>Defines dependencies (references)</a:t>
-            </a:r>
-          </a:p>
-          <a:p>
-            <a:pPr lvl="1"/>
-            <a:r>
-              <a:rPr lang="en-US" dirty="0"/>
-              <a:t>Defines framework</a:t>
-            </a:r>
-          </a:p>
-          <a:p>
-            <a:pPr lvl="1"/>
-            <a:r>
-              <a:rPr lang="en-US" dirty="0"/>
-              <a:t>Defines the “build”</a:t>
-            </a:r>
-          </a:p>
-        </p:txBody>
-      </p:sp>
-      <p:pic>
-        <p:nvPicPr>
-          <p:cNvPr id="4" name="Picture 3"/>
-          <p:cNvPicPr>
-            <a:picLocks noChangeAspect="1"/>
-          </p:cNvPicPr>
-          <p:nvPr/>
-        </p:nvPicPr>
-        <p:blipFill>
-          <a:blip r:embed="rId2"/>
-          <a:stretch>
-            <a:fillRect/>
-          </a:stretch>
-        </p:blipFill>
-        <p:spPr>
-          <a:xfrm>
-            <a:off x="1690688" y="2971800"/>
-            <a:ext cx="5319712" cy="3430780"/>
-          </a:xfrm>
-          <a:prstGeom prst="rect">
-            <a:avLst/>
-          </a:prstGeom>
-          <a:ln>
-            <a:noFill/>
-          </a:ln>
-          <a:effectLst>
-            <a:outerShdw blurRad="292100" dist="139700" dir="2700000" algn="tl" rotWithShape="0">
-              <a:srgbClr val="333333">
-                <a:alpha val="65000"/>
-              </a:srgbClr>
-            </a:outerShdw>
-          </a:effectLst>
-        </p:spPr>
-      </p:pic>
-    </p:spTree>
-    <p:extLst>
-      <p:ext uri="{BB962C8B-B14F-4D97-AF65-F5344CB8AC3E}">
-        <p14:creationId xmlns:p14="http://schemas.microsoft.com/office/powerpoint/2010/main" val="3011975128"/>
-      </p:ext>
-    </p:extLst>
-  </p:cSld>
-  <p:clrMapOvr>
-    <a:masterClrMapping/>
-  </p:clrMapOvr>
-  <p:transition>
-    <p:fade/>
-  </p:transition>
-</p:sld>
-</file>
-
-<file path=ppt/slides/slide11.xml><?xml version="1.0" encoding="utf-8"?>
-<p:sld xmlns:a="http://schemas.openxmlformats.org/drawingml/2006/main" xmlns:r="http://schemas.openxmlformats.org/officeDocument/2006/relationships" xmlns:p="http://schemas.openxmlformats.org/presentationml/2006/main">
-  <p:cSld>
-    <p:spTree>
-      <p:nvGrpSpPr>
-        <p:cNvPr id="1" name=""/>
-        <p:cNvGrpSpPr/>
-        <p:nvPr/>
-      </p:nvGrpSpPr>
-      <p:grpSpPr>
-        <a:xfrm>
-          <a:off x="0" y="0"/>
-          <a:ext cx="0" cy="0"/>
-          <a:chOff x="0" y="0"/>
-          <a:chExt cx="0" cy="0"/>
-        </a:xfrm>
-      </p:grpSpPr>
-      <p:sp>
-        <p:nvSpPr>
-          <p:cNvPr id="2" name="Title 1"/>
-          <p:cNvSpPr>
-            <a:spLocks noGrp="1"/>
-          </p:cNvSpPr>
-          <p:nvPr>
-            <p:ph type="title"/>
-          </p:nvPr>
-        </p:nvSpPr>
-        <p:spPr/>
-        <p:txBody>
-          <a:bodyPr/>
-          <a:lstStyle/>
-          <a:p>
-            <a:r>
-              <a:rPr lang="en-US" dirty="0"/>
               <a:t>Dependencies</a:t>
             </a:r>
           </a:p>
@@ -3801,7 +3562,7 @@
 </p:sld>
 </file>
 
-<file path=ppt/slides/slide12.xml><?xml version="1.0" encoding="utf-8"?>
+<file path=ppt/slides/slide11.xml><?xml version="1.0" encoding="utf-8"?>
 <p:sld xmlns:a="http://schemas.openxmlformats.org/drawingml/2006/main" xmlns:r="http://schemas.openxmlformats.org/officeDocument/2006/relationships" xmlns:p="http://schemas.openxmlformats.org/presentationml/2006/main">
   <p:cSld>
     <p:spTree>
@@ -3877,31 +3638,7 @@
       </p:sp>
       <p:pic>
         <p:nvPicPr>
-          <p:cNvPr id="4" name="Picture 3"/>
-          <p:cNvPicPr>
-            <a:picLocks noChangeAspect="1"/>
-          </p:cNvPicPr>
-          <p:nvPr/>
-        </p:nvPicPr>
-        <p:blipFill>
-          <a:blip r:embed="rId2"/>
-          <a:stretch>
-            <a:fillRect/>
-          </a:stretch>
-        </p:blipFill>
-        <p:spPr>
-          <a:xfrm>
-            <a:off x="1524000" y="3200400"/>
-            <a:ext cx="2676525" cy="1152525"/>
-          </a:xfrm>
-          <a:prstGeom prst="rect">
-            <a:avLst/>
-          </a:prstGeom>
-        </p:spPr>
-      </p:pic>
-      <p:pic>
-        <p:nvPicPr>
-          <p:cNvPr id="5" name="Picture 4"/>
+          <p:cNvPr id="6" name="Picture 5"/>
           <p:cNvPicPr>
             <a:picLocks noChangeAspect="1"/>
           </p:cNvPicPr>
@@ -3915,8 +3652,32 @@
         </p:blipFill>
         <p:spPr>
           <a:xfrm>
-            <a:off x="4953000" y="3438524"/>
-            <a:ext cx="2305050" cy="676275"/>
+            <a:off x="885825" y="2662237"/>
+            <a:ext cx="7372350" cy="1533525"/>
+          </a:xfrm>
+          <a:prstGeom prst="rect">
+            <a:avLst/>
+          </a:prstGeom>
+        </p:spPr>
+      </p:pic>
+      <p:pic>
+        <p:nvPicPr>
+          <p:cNvPr id="7" name="Picture 6"/>
+          <p:cNvPicPr>
+            <a:picLocks noChangeAspect="1"/>
+          </p:cNvPicPr>
+          <p:nvPr/>
+        </p:nvPicPr>
+        <p:blipFill>
+          <a:blip r:embed="rId4"/>
+          <a:stretch>
+            <a:fillRect/>
+          </a:stretch>
+        </p:blipFill>
+        <p:spPr>
+          <a:xfrm>
+            <a:off x="809625" y="4455318"/>
+            <a:ext cx="7524750" cy="1228725"/>
           </a:xfrm>
           <a:prstGeom prst="rect">
             <a:avLst/>
@@ -3939,7 +3700,7 @@
 </p:sld>
 </file>
 
-<file path=ppt/slides/slide13.xml><?xml version="1.0" encoding="utf-8"?>
+<file path=ppt/slides/slide12.xml><?xml version="1.0" encoding="utf-8"?>
 <p:sld xmlns:a="http://schemas.openxmlformats.org/drawingml/2006/main" xmlns:r="http://schemas.openxmlformats.org/officeDocument/2006/relationships" xmlns:p="http://schemas.openxmlformats.org/presentationml/2006/main">
   <p:cSld>
     <p:spTree>
@@ -4046,7 +3807,7 @@
 </p:sld>
 </file>
 
-<file path=ppt/slides/slide14.xml><?xml version="1.0" encoding="utf-8"?>
+<file path=ppt/slides/slide13.xml><?xml version="1.0" encoding="utf-8"?>
 <p:sld xmlns:a="http://schemas.openxmlformats.org/drawingml/2006/main" xmlns:r="http://schemas.openxmlformats.org/officeDocument/2006/relationships" xmlns:p="http://schemas.openxmlformats.org/presentationml/2006/main">
   <p:cSld>
     <p:spTree>
@@ -4080,7 +3841,7 @@
           <a:p>
             <a:r>
               <a:rPr lang="en-US" dirty="0"/>
-              <a:t>Managing .NET</a:t>
+              <a:t>Executing .NET</a:t>
             </a:r>
           </a:p>
         </p:txBody>
@@ -4101,119 +3862,12 @@
           <a:lstStyle/>
           <a:p>
             <a:r>
+              <a:rPr lang="en-US" dirty="0" err="1"/>
+              <a:t>dotnet</a:t>
+            </a:r>
+            <a:r>
               <a:rPr lang="en-US" dirty="0"/>
-              <a:t>DNVM - .NET Version Manager</a:t>
-            </a:r>
-          </a:p>
-          <a:p>
-            <a:pPr lvl="1"/>
-            <a:r>
-              <a:rPr lang="en-US" dirty="0"/>
-              <a:t>Set default execution environment</a:t>
-            </a:r>
-          </a:p>
-          <a:p>
-            <a:endParaRPr lang="en-US" dirty="0"/>
-          </a:p>
-        </p:txBody>
-      </p:sp>
-      <p:pic>
-        <p:nvPicPr>
-          <p:cNvPr id="4" name="Picture 3"/>
-          <p:cNvPicPr>
-            <a:picLocks noChangeAspect="1"/>
-          </p:cNvPicPr>
-          <p:nvPr/>
-        </p:nvPicPr>
-        <p:blipFill>
-          <a:blip r:embed="rId3"/>
-          <a:stretch>
-            <a:fillRect/>
-          </a:stretch>
-        </p:blipFill>
-        <p:spPr>
-          <a:xfrm>
-            <a:off x="1555011" y="2209800"/>
-            <a:ext cx="6033978" cy="4401193"/>
-          </a:xfrm>
-          <a:prstGeom prst="rect">
-            <a:avLst/>
-          </a:prstGeom>
-        </p:spPr>
-      </p:pic>
-    </p:spTree>
-    <p:extLst>
-      <p:ext uri="{BB962C8B-B14F-4D97-AF65-F5344CB8AC3E}">
-        <p14:creationId xmlns:p14="http://schemas.microsoft.com/office/powerpoint/2010/main" val="131624184"/>
-      </p:ext>
-    </p:extLst>
-  </p:cSld>
-  <p:clrMapOvr>
-    <a:masterClrMapping/>
-  </p:clrMapOvr>
-  <p:transition>
-    <p:fade/>
-  </p:transition>
-</p:sld>
-</file>
-
-<file path=ppt/slides/slide15.xml><?xml version="1.0" encoding="utf-8"?>
-<p:sld xmlns:a="http://schemas.openxmlformats.org/drawingml/2006/main" xmlns:r="http://schemas.openxmlformats.org/officeDocument/2006/relationships" xmlns:p="http://schemas.openxmlformats.org/presentationml/2006/main">
-  <p:cSld>
-    <p:spTree>
-      <p:nvGrpSpPr>
-        <p:cNvPr id="1" name=""/>
-        <p:cNvGrpSpPr/>
-        <p:nvPr/>
-      </p:nvGrpSpPr>
-      <p:grpSpPr>
-        <a:xfrm>
-          <a:off x="0" y="0"/>
-          <a:ext cx="0" cy="0"/>
-          <a:chOff x="0" y="0"/>
-          <a:chExt cx="0" cy="0"/>
-        </a:xfrm>
-      </p:grpSpPr>
-      <p:sp>
-        <p:nvSpPr>
-          <p:cNvPr id="2" name="Title 1"/>
-          <p:cNvSpPr>
-            <a:spLocks noGrp="1"/>
-          </p:cNvSpPr>
-          <p:nvPr>
-            <p:ph type="title"/>
-          </p:nvPr>
-        </p:nvSpPr>
-        <p:spPr/>
-        <p:txBody>
-          <a:bodyPr/>
-          <a:lstStyle/>
-          <a:p>
-            <a:r>
-              <a:rPr lang="en-US" dirty="0"/>
-              <a:t>Executing .NET</a:t>
-            </a:r>
-          </a:p>
-        </p:txBody>
-      </p:sp>
-      <p:sp>
-        <p:nvSpPr>
-          <p:cNvPr id="3" name="Text Placeholder 2"/>
-          <p:cNvSpPr>
-            <a:spLocks noGrp="1"/>
-          </p:cNvSpPr>
-          <p:nvPr>
-            <p:ph type="body" idx="1"/>
-          </p:nvPr>
-        </p:nvSpPr>
-        <p:spPr/>
-        <p:txBody>
-          <a:bodyPr/>
-          <a:lstStyle/>
-          <a:p>
-            <a:r>
-              <a:rPr lang="en-US" dirty="0"/>
-              <a:t>DNX - .NET Execution Environment</a:t>
+              <a:t> - .NET Execution Environment</a:t>
             </a:r>
           </a:p>
           <a:p>
@@ -4246,8 +3900,8 @@
         </p:blipFill>
         <p:spPr>
           <a:xfrm>
-            <a:off x="1600200" y="2819400"/>
-            <a:ext cx="5109942" cy="3727199"/>
+            <a:off x="838200" y="3200400"/>
+            <a:ext cx="7696200" cy="1821586"/>
           </a:xfrm>
           <a:prstGeom prst="rect">
             <a:avLst/>
@@ -4270,211 +3924,7 @@
 </p:sld>
 </file>
 
-<file path=ppt/slides/slide16.xml><?xml version="1.0" encoding="utf-8"?>
-<p:sld xmlns:a="http://schemas.openxmlformats.org/drawingml/2006/main" xmlns:r="http://schemas.openxmlformats.org/officeDocument/2006/relationships" xmlns:p="http://schemas.openxmlformats.org/presentationml/2006/main">
-  <p:cSld>
-    <p:spTree>
-      <p:nvGrpSpPr>
-        <p:cNvPr id="1" name=""/>
-        <p:cNvGrpSpPr/>
-        <p:nvPr/>
-      </p:nvGrpSpPr>
-      <p:grpSpPr>
-        <a:xfrm>
-          <a:off x="0" y="0"/>
-          <a:ext cx="0" cy="0"/>
-          <a:chOff x="0" y="0"/>
-          <a:chExt cx="0" cy="0"/>
-        </a:xfrm>
-      </p:grpSpPr>
-      <p:sp>
-        <p:nvSpPr>
-          <p:cNvPr id="2" name="Title 1"/>
-          <p:cNvSpPr>
-            <a:spLocks noGrp="1"/>
-          </p:cNvSpPr>
-          <p:nvPr>
-            <p:ph type="title"/>
-          </p:nvPr>
-        </p:nvSpPr>
-        <p:spPr/>
-        <p:txBody>
-          <a:bodyPr/>
-          <a:lstStyle/>
-          <a:p>
-            <a:r>
-              <a:rPr lang="en-US" dirty="0"/>
-              <a:t>Managing Runtimes From VS</a:t>
-            </a:r>
-          </a:p>
-        </p:txBody>
-      </p:sp>
-      <p:sp>
-        <p:nvSpPr>
-          <p:cNvPr id="3" name="Text Placeholder 2"/>
-          <p:cNvSpPr>
-            <a:spLocks noGrp="1"/>
-          </p:cNvSpPr>
-          <p:nvPr>
-            <p:ph type="body" idx="1"/>
-          </p:nvPr>
-        </p:nvSpPr>
-        <p:spPr/>
-        <p:txBody>
-          <a:bodyPr/>
-          <a:lstStyle/>
-          <a:p>
-            <a:endParaRPr lang="en-US"/>
-          </a:p>
-        </p:txBody>
-      </p:sp>
-      <p:pic>
-        <p:nvPicPr>
-          <p:cNvPr id="4" name="Picture 3"/>
-          <p:cNvPicPr>
-            <a:picLocks noChangeAspect="1"/>
-          </p:cNvPicPr>
-          <p:nvPr/>
-        </p:nvPicPr>
-        <p:blipFill>
-          <a:blip r:embed="rId2"/>
-          <a:stretch>
-            <a:fillRect/>
-          </a:stretch>
-        </p:blipFill>
-        <p:spPr>
-          <a:xfrm>
-            <a:off x="1066800" y="1295400"/>
-            <a:ext cx="7153275" cy="5015153"/>
-          </a:xfrm>
-          <a:prstGeom prst="rect">
-            <a:avLst/>
-          </a:prstGeom>
-        </p:spPr>
-      </p:pic>
-    </p:spTree>
-    <p:extLst>
-      <p:ext uri="{BB962C8B-B14F-4D97-AF65-F5344CB8AC3E}">
-        <p14:creationId xmlns:p14="http://schemas.microsoft.com/office/powerpoint/2010/main" val="1280110417"/>
-      </p:ext>
-    </p:extLst>
-  </p:cSld>
-  <p:clrMapOvr>
-    <a:masterClrMapping/>
-  </p:clrMapOvr>
-  <p:transition>
-    <p:fade/>
-  </p:transition>
-</p:sld>
-</file>
-
-<file path=ppt/slides/slide17.xml><?xml version="1.0" encoding="utf-8"?>
-<p:sld xmlns:a="http://schemas.openxmlformats.org/drawingml/2006/main" xmlns:r="http://schemas.openxmlformats.org/officeDocument/2006/relationships" xmlns:p="http://schemas.openxmlformats.org/presentationml/2006/main">
-  <p:cSld>
-    <p:spTree>
-      <p:nvGrpSpPr>
-        <p:cNvPr id="1" name=""/>
-        <p:cNvGrpSpPr/>
-        <p:nvPr/>
-      </p:nvGrpSpPr>
-      <p:grpSpPr>
-        <a:xfrm>
-          <a:off x="0" y="0"/>
-          <a:ext cx="0" cy="0"/>
-          <a:chOff x="0" y="0"/>
-          <a:chExt cx="0" cy="0"/>
-        </a:xfrm>
-      </p:grpSpPr>
-      <p:sp>
-        <p:nvSpPr>
-          <p:cNvPr id="2" name="Title 1"/>
-          <p:cNvSpPr>
-            <a:spLocks noGrp="1"/>
-          </p:cNvSpPr>
-          <p:nvPr>
-            <p:ph type="title"/>
-          </p:nvPr>
-        </p:nvSpPr>
-        <p:spPr/>
-        <p:txBody>
-          <a:bodyPr/>
-          <a:lstStyle/>
-          <a:p>
-            <a:r>
-              <a:rPr lang="en-US" dirty="0"/>
-              <a:t>Locations</a:t>
-            </a:r>
-          </a:p>
-        </p:txBody>
-      </p:sp>
-      <p:sp>
-        <p:nvSpPr>
-          <p:cNvPr id="3" name="Text Placeholder 2"/>
-          <p:cNvSpPr>
-            <a:spLocks noGrp="1"/>
-          </p:cNvSpPr>
-          <p:nvPr>
-            <p:ph type="body" idx="1"/>
-          </p:nvPr>
-        </p:nvSpPr>
-        <p:spPr/>
-        <p:txBody>
-          <a:bodyPr/>
-          <a:lstStyle/>
-          <a:p>
-            <a:r>
-              <a:rPr lang="en-US" dirty="0"/>
-              <a:t>Look in ~/.</a:t>
-            </a:r>
-            <a:r>
-              <a:rPr lang="en-US" dirty="0" err="1"/>
-              <a:t>dnx</a:t>
-            </a:r>
-            <a:endParaRPr lang="en-US" dirty="0"/>
-          </a:p>
-        </p:txBody>
-      </p:sp>
-      <p:pic>
-        <p:nvPicPr>
-          <p:cNvPr id="4" name="Picture 3"/>
-          <p:cNvPicPr>
-            <a:picLocks noChangeAspect="1"/>
-          </p:cNvPicPr>
-          <p:nvPr/>
-        </p:nvPicPr>
-        <p:blipFill>
-          <a:blip r:embed="rId3"/>
-          <a:stretch>
-            <a:fillRect/>
-          </a:stretch>
-        </p:blipFill>
-        <p:spPr>
-          <a:xfrm>
-            <a:off x="280987" y="2362200"/>
-            <a:ext cx="8582025" cy="3419475"/>
-          </a:xfrm>
-          <a:prstGeom prst="rect">
-            <a:avLst/>
-          </a:prstGeom>
-        </p:spPr>
-      </p:pic>
-    </p:spTree>
-    <p:extLst>
-      <p:ext uri="{BB962C8B-B14F-4D97-AF65-F5344CB8AC3E}">
-        <p14:creationId xmlns:p14="http://schemas.microsoft.com/office/powerpoint/2010/main" val="836720630"/>
-      </p:ext>
-    </p:extLst>
-  </p:cSld>
-  <p:clrMapOvr>
-    <a:masterClrMapping/>
-  </p:clrMapOvr>
-  <p:transition>
-    <p:fade/>
-  </p:transition>
-</p:sld>
-</file>
-
-<file path=ppt/slides/slide18.xml><?xml version="1.0" encoding="utf-8"?>
+<file path=ppt/slides/slide14.xml><?xml version="1.0" encoding="utf-8"?>
 <p:sld xmlns:a="http://schemas.openxmlformats.org/drawingml/2006/main" xmlns:r="http://schemas.openxmlformats.org/officeDocument/2006/relationships" xmlns:p="http://schemas.openxmlformats.org/presentationml/2006/main">
   <p:cSld>
     <p:spTree>
@@ -4596,7 +4046,7 @@
 </p:sld>
 </file>
 
-<file path=ppt/slides/slide19.xml><?xml version="1.0" encoding="utf-8"?>
+<file path=ppt/slides/slide15.xml><?xml version="1.0" encoding="utf-8"?>
 <p:sld xmlns:a="http://schemas.openxmlformats.org/drawingml/2006/main" xmlns:r="http://schemas.openxmlformats.org/officeDocument/2006/relationships" xmlns:p="http://schemas.openxmlformats.org/presentationml/2006/main">
   <p:cSld>
     <p:spTree>
@@ -4655,17 +4105,1606 @@
               <a:t>Middleware is the HTTP processing pipeline</a:t>
             </a:r>
           </a:p>
+        </p:txBody>
+      </p:sp>
+      <p:sp>
+        <p:nvSpPr>
+          <p:cNvPr id="4" name="Rectangle 3"/>
+          <p:cNvSpPr/>
+          <p:nvPr/>
+        </p:nvSpPr>
+        <p:spPr bwMode="auto">
+          <a:xfrm>
+            <a:off x="698500" y="2971800"/>
+            <a:ext cx="2286000" cy="1447800"/>
+          </a:xfrm>
+          <a:prstGeom prst="rect">
+            <a:avLst/>
+          </a:prstGeom>
+          <a:solidFill>
+            <a:srgbClr val="D3D3A9"/>
+          </a:solidFill>
+          <a:ln>
+            <a:headEnd/>
+            <a:tailEnd/>
+          </a:ln>
+        </p:spPr>
+        <p:style>
+          <a:lnRef idx="2">
+            <a:schemeClr val="dk1">
+              <a:shade val="50000"/>
+            </a:schemeClr>
+          </a:lnRef>
+          <a:fillRef idx="1">
+            <a:schemeClr val="dk1"/>
+          </a:fillRef>
+          <a:effectRef idx="0">
+            <a:schemeClr val="dk1"/>
+          </a:effectRef>
+          <a:fontRef idx="minor">
+            <a:schemeClr val="lt1"/>
+          </a:fontRef>
+        </p:style>
+        <p:txBody>
+          <a:bodyPr wrap="none" rtlCol="0" anchor="ctr"/>
+          <a:lstStyle/>
+          <a:p>
+            <a:pPr algn="ctr"/>
+            <a:r>
+              <a:rPr lang="en-US" sz="2000" dirty="0">
+                <a:solidFill>
+                  <a:schemeClr val="tx1"/>
+                </a:solidFill>
+                <a:latin typeface="Tekton Pro" pitchFamily="34" charset="0"/>
+              </a:rPr>
+              <a:t>Me</a:t>
+            </a:r>
+          </a:p>
+        </p:txBody>
+      </p:sp>
+      <p:sp>
+        <p:nvSpPr>
+          <p:cNvPr id="5" name="Rectangle 4"/>
+          <p:cNvSpPr/>
+          <p:nvPr/>
+        </p:nvSpPr>
+        <p:spPr bwMode="auto">
+          <a:xfrm>
+            <a:off x="3403600" y="2971800"/>
+            <a:ext cx="2286000" cy="1447800"/>
+          </a:xfrm>
+          <a:prstGeom prst="rect">
+            <a:avLst/>
+          </a:prstGeom>
+          <a:solidFill>
+            <a:srgbClr val="D3D3A9"/>
+          </a:solidFill>
+          <a:ln>
+            <a:headEnd/>
+            <a:tailEnd/>
+          </a:ln>
+        </p:spPr>
+        <p:style>
+          <a:lnRef idx="2">
+            <a:schemeClr val="dk1">
+              <a:shade val="50000"/>
+            </a:schemeClr>
+          </a:lnRef>
+          <a:fillRef idx="1">
+            <a:schemeClr val="dk1"/>
+          </a:fillRef>
+          <a:effectRef idx="0">
+            <a:schemeClr val="dk1"/>
+          </a:effectRef>
+          <a:fontRef idx="minor">
+            <a:schemeClr val="lt1"/>
+          </a:fontRef>
+        </p:style>
+        <p:txBody>
+          <a:bodyPr wrap="none" rtlCol="0" anchor="ctr"/>
+          <a:lstStyle/>
+          <a:p>
+            <a:pPr algn="ctr"/>
+            <a:r>
+              <a:rPr lang="en-US" sz="2000" dirty="0">
+                <a:solidFill>
+                  <a:schemeClr val="tx1"/>
+                </a:solidFill>
+                <a:latin typeface="Tekton Pro" pitchFamily="34" charset="0"/>
+              </a:rPr>
+              <a:t>Mom</a:t>
+            </a:r>
+          </a:p>
+        </p:txBody>
+      </p:sp>
+      <p:sp>
+        <p:nvSpPr>
+          <p:cNvPr id="6" name="Rectangle 5"/>
+          <p:cNvSpPr/>
+          <p:nvPr/>
+        </p:nvSpPr>
+        <p:spPr bwMode="auto">
+          <a:xfrm>
+            <a:off x="6096000" y="2971800"/>
+            <a:ext cx="2286000" cy="1447800"/>
+          </a:xfrm>
+          <a:prstGeom prst="rect">
+            <a:avLst/>
+          </a:prstGeom>
+          <a:solidFill>
+            <a:srgbClr val="D3D3A9"/>
+          </a:solidFill>
+          <a:ln>
+            <a:headEnd/>
+            <a:tailEnd/>
+          </a:ln>
+        </p:spPr>
+        <p:style>
+          <a:lnRef idx="2">
+            <a:schemeClr val="dk1">
+              <a:shade val="50000"/>
+            </a:schemeClr>
+          </a:lnRef>
+          <a:fillRef idx="1">
+            <a:schemeClr val="dk1"/>
+          </a:fillRef>
+          <a:effectRef idx="0">
+            <a:schemeClr val="dk1"/>
+          </a:effectRef>
+          <a:fontRef idx="minor">
+            <a:schemeClr val="lt1"/>
+          </a:fontRef>
+        </p:style>
+        <p:txBody>
+          <a:bodyPr wrap="none" rtlCol="0" anchor="ctr"/>
+          <a:lstStyle/>
+          <a:p>
+            <a:pPr algn="ctr"/>
+            <a:r>
+              <a:rPr lang="en-US" sz="2000" dirty="0">
+                <a:solidFill>
+                  <a:schemeClr val="tx1"/>
+                </a:solidFill>
+                <a:latin typeface="Tekton Pro" pitchFamily="34" charset="0"/>
+              </a:rPr>
+              <a:t>Dad</a:t>
+            </a:r>
+          </a:p>
+        </p:txBody>
+      </p:sp>
+      <p:sp>
+        <p:nvSpPr>
+          <p:cNvPr id="7" name="Right Arrow 8"/>
+          <p:cNvSpPr/>
+          <p:nvPr/>
+        </p:nvSpPr>
+        <p:spPr bwMode="auto">
+          <a:xfrm>
+            <a:off x="2644775" y="3000375"/>
+            <a:ext cx="1092200" cy="609600"/>
+          </a:xfrm>
+          <a:prstGeom prst="rightArrow">
+            <a:avLst/>
+          </a:prstGeom>
+          <a:ln>
+            <a:headEnd/>
+            <a:tailEnd/>
+          </a:ln>
+        </p:spPr>
+        <p:style>
+          <a:lnRef idx="2">
+            <a:schemeClr val="dk1">
+              <a:shade val="50000"/>
+            </a:schemeClr>
+          </a:lnRef>
+          <a:fillRef idx="1">
+            <a:schemeClr val="dk1"/>
+          </a:fillRef>
+          <a:effectRef idx="0">
+            <a:schemeClr val="dk1"/>
+          </a:effectRef>
+          <a:fontRef idx="minor">
+            <a:schemeClr val="lt1"/>
+          </a:fontRef>
+        </p:style>
+        <p:txBody>
+          <a:bodyPr wrap="none" rtlCol="0" anchor="ctr"/>
+          <a:lstStyle/>
+          <a:p>
+            <a:pPr algn="ctr"/>
+            <a:r>
+              <a:rPr lang="en-US" sz="2000" dirty="0">
+                <a:latin typeface="Tekton Pro" pitchFamily="34" charset="0"/>
+              </a:rPr>
+              <a:t>next</a:t>
+            </a:r>
+          </a:p>
+        </p:txBody>
+      </p:sp>
+      <p:sp>
+        <p:nvSpPr>
+          <p:cNvPr id="8" name="Right Arrow 12"/>
+          <p:cNvSpPr/>
+          <p:nvPr/>
+        </p:nvSpPr>
+        <p:spPr bwMode="auto">
+          <a:xfrm>
+            <a:off x="5338960" y="3000375"/>
+            <a:ext cx="1092200" cy="609600"/>
+          </a:xfrm>
+          <a:prstGeom prst="rightArrow">
+            <a:avLst/>
+          </a:prstGeom>
+          <a:ln>
+            <a:headEnd/>
+            <a:tailEnd/>
+          </a:ln>
+        </p:spPr>
+        <p:style>
+          <a:lnRef idx="2">
+            <a:schemeClr val="dk1">
+              <a:shade val="50000"/>
+            </a:schemeClr>
+          </a:lnRef>
+          <a:fillRef idx="1">
+            <a:schemeClr val="dk1"/>
+          </a:fillRef>
+          <a:effectRef idx="0">
+            <a:schemeClr val="dk1"/>
+          </a:effectRef>
+          <a:fontRef idx="minor">
+            <a:schemeClr val="lt1"/>
+          </a:fontRef>
+        </p:style>
+        <p:txBody>
+          <a:bodyPr wrap="none" rtlCol="0" anchor="ctr"/>
+          <a:lstStyle/>
+          <a:p>
+            <a:pPr algn="ctr"/>
+            <a:r>
+              <a:rPr lang="en-US" sz="2000" dirty="0">
+                <a:latin typeface="Tekton Pro" pitchFamily="34" charset="0"/>
+              </a:rPr>
+              <a:t>next</a:t>
+            </a:r>
+          </a:p>
+        </p:txBody>
+      </p:sp>
+      <p:sp>
+        <p:nvSpPr>
+          <p:cNvPr id="9" name="Left Arrow 9"/>
+          <p:cNvSpPr/>
+          <p:nvPr/>
+        </p:nvSpPr>
+        <p:spPr bwMode="auto">
+          <a:xfrm>
+            <a:off x="5353199" y="3790950"/>
+            <a:ext cx="1094780" cy="609600"/>
+          </a:xfrm>
+          <a:prstGeom prst="leftArrow">
+            <a:avLst/>
+          </a:prstGeom>
+          <a:ln>
+            <a:headEnd/>
+            <a:tailEnd/>
+          </a:ln>
+        </p:spPr>
+        <p:style>
+          <a:lnRef idx="2">
+            <a:schemeClr val="dk1">
+              <a:shade val="50000"/>
+            </a:schemeClr>
+          </a:lnRef>
+          <a:fillRef idx="1">
+            <a:schemeClr val="dk1"/>
+          </a:fillRef>
+          <a:effectRef idx="0">
+            <a:schemeClr val="dk1"/>
+          </a:effectRef>
+          <a:fontRef idx="minor">
+            <a:schemeClr val="lt1"/>
+          </a:fontRef>
+        </p:style>
+        <p:txBody>
+          <a:bodyPr wrap="none" rtlCol="0" anchor="ctr"/>
+          <a:lstStyle/>
+          <a:p>
+            <a:pPr algn="ctr"/>
+            <a:r>
+              <a:rPr lang="en-US" sz="2000" dirty="0">
+                <a:latin typeface="Tekton Pro" pitchFamily="34" charset="0"/>
+              </a:rPr>
+              <a:t>return</a:t>
+            </a:r>
+          </a:p>
+        </p:txBody>
+      </p:sp>
+      <p:sp>
+        <p:nvSpPr>
+          <p:cNvPr id="10" name="Left Arrow 20"/>
+          <p:cNvSpPr/>
+          <p:nvPr/>
+        </p:nvSpPr>
+        <p:spPr bwMode="auto">
+          <a:xfrm>
+            <a:off x="2653010" y="3810000"/>
+            <a:ext cx="1094780" cy="609600"/>
+          </a:xfrm>
+          <a:prstGeom prst="leftArrow">
+            <a:avLst/>
+          </a:prstGeom>
+          <a:ln>
+            <a:headEnd/>
+            <a:tailEnd/>
+          </a:ln>
+        </p:spPr>
+        <p:style>
+          <a:lnRef idx="2">
+            <a:schemeClr val="dk1">
+              <a:shade val="50000"/>
+            </a:schemeClr>
+          </a:lnRef>
+          <a:fillRef idx="1">
+            <a:schemeClr val="dk1"/>
+          </a:fillRef>
+          <a:effectRef idx="0">
+            <a:schemeClr val="dk1"/>
+          </a:effectRef>
+          <a:fontRef idx="minor">
+            <a:schemeClr val="lt1"/>
+          </a:fontRef>
+        </p:style>
+        <p:txBody>
+          <a:bodyPr wrap="none" rtlCol="0" anchor="ctr"/>
+          <a:lstStyle/>
+          <a:p>
+            <a:pPr algn="ctr"/>
+            <a:r>
+              <a:rPr lang="en-US" sz="2000" dirty="0">
+                <a:latin typeface="Tekton Pro" pitchFamily="34" charset="0"/>
+              </a:rPr>
+              <a:t>return</a:t>
+            </a:r>
+          </a:p>
+        </p:txBody>
+      </p:sp>
+      <p:sp>
+        <p:nvSpPr>
+          <p:cNvPr id="11" name="Rectangle 10"/>
+          <p:cNvSpPr/>
+          <p:nvPr/>
+        </p:nvSpPr>
+        <p:spPr bwMode="auto">
+          <a:xfrm>
+            <a:off x="931167" y="2476500"/>
+            <a:ext cx="1820665" cy="609600"/>
+          </a:xfrm>
+          <a:prstGeom prst="rect">
+            <a:avLst/>
+          </a:prstGeom>
+          <a:ln>
+            <a:headEnd/>
+            <a:tailEnd/>
+          </a:ln>
+        </p:spPr>
+        <p:style>
+          <a:lnRef idx="2">
+            <a:schemeClr val="accent1">
+              <a:shade val="50000"/>
+            </a:schemeClr>
+          </a:lnRef>
+          <a:fillRef idx="1">
+            <a:schemeClr val="accent1"/>
+          </a:fillRef>
+          <a:effectRef idx="0">
+            <a:schemeClr val="accent1"/>
+          </a:effectRef>
+          <a:fontRef idx="minor">
+            <a:schemeClr val="lt1"/>
+          </a:fontRef>
+        </p:style>
+        <p:txBody>
+          <a:bodyPr wrap="none" rtlCol="0" anchor="ctr"/>
+          <a:lstStyle/>
+          <a:p>
+            <a:pPr algn="ctr"/>
+            <a:r>
+              <a:rPr lang="en-US" sz="2000" dirty="0">
+                <a:latin typeface="Tekton Pro" pitchFamily="34" charset="0"/>
+              </a:rPr>
+              <a:t>POST /corn</a:t>
+            </a:r>
+          </a:p>
+        </p:txBody>
+      </p:sp>
+      <p:sp>
+        <p:nvSpPr>
+          <p:cNvPr id="12" name="Rectangle 11"/>
+          <p:cNvSpPr/>
+          <p:nvPr/>
+        </p:nvSpPr>
+        <p:spPr bwMode="auto">
+          <a:xfrm>
+            <a:off x="3649861" y="2433638"/>
+            <a:ext cx="1820665" cy="609600"/>
+          </a:xfrm>
+          <a:prstGeom prst="rect">
+            <a:avLst/>
+          </a:prstGeom>
+          <a:ln>
+            <a:headEnd/>
+            <a:tailEnd/>
+          </a:ln>
+        </p:spPr>
+        <p:style>
+          <a:lnRef idx="2">
+            <a:schemeClr val="accent1">
+              <a:shade val="50000"/>
+            </a:schemeClr>
+          </a:lnRef>
+          <a:fillRef idx="1">
+            <a:schemeClr val="accent1"/>
+          </a:fillRef>
+          <a:effectRef idx="0">
+            <a:schemeClr val="accent1"/>
+          </a:effectRef>
+          <a:fontRef idx="minor">
+            <a:schemeClr val="lt1"/>
+          </a:fontRef>
+        </p:style>
+        <p:txBody>
+          <a:bodyPr wrap="none" rtlCol="0" anchor="ctr"/>
+          <a:lstStyle/>
+          <a:p>
+            <a:pPr algn="ctr"/>
+            <a:r>
+              <a:rPr lang="en-US" sz="2000" dirty="0">
+                <a:latin typeface="Tekton Pro" pitchFamily="34" charset="0"/>
+              </a:rPr>
+              <a:t>POST /corn</a:t>
+            </a:r>
+          </a:p>
+        </p:txBody>
+      </p:sp>
+      <p:sp>
+        <p:nvSpPr>
+          <p:cNvPr id="13" name="Rectangle 12"/>
+          <p:cNvSpPr/>
+          <p:nvPr/>
+        </p:nvSpPr>
+        <p:spPr bwMode="auto">
+          <a:xfrm>
+            <a:off x="6370836" y="2433638"/>
+            <a:ext cx="1820665" cy="609600"/>
+          </a:xfrm>
+          <a:prstGeom prst="rect">
+            <a:avLst/>
+          </a:prstGeom>
+          <a:ln>
+            <a:headEnd/>
+            <a:tailEnd/>
+          </a:ln>
+        </p:spPr>
+        <p:style>
+          <a:lnRef idx="2">
+            <a:schemeClr val="accent1">
+              <a:shade val="50000"/>
+            </a:schemeClr>
+          </a:lnRef>
+          <a:fillRef idx="1">
+            <a:schemeClr val="accent1"/>
+          </a:fillRef>
+          <a:effectRef idx="0">
+            <a:schemeClr val="accent1"/>
+          </a:effectRef>
+          <a:fontRef idx="minor">
+            <a:schemeClr val="lt1"/>
+          </a:fontRef>
+        </p:style>
+        <p:txBody>
+          <a:bodyPr wrap="none" rtlCol="0" anchor="ctr"/>
+          <a:lstStyle/>
+          <a:p>
+            <a:pPr algn="ctr"/>
+            <a:r>
+              <a:rPr lang="en-US" sz="2000" dirty="0">
+                <a:latin typeface="Tekton Pro" pitchFamily="34" charset="0"/>
+              </a:rPr>
+              <a:t>POST /corn</a:t>
+            </a:r>
+          </a:p>
+        </p:txBody>
+      </p:sp>
+      <p:sp>
+        <p:nvSpPr>
+          <p:cNvPr id="14" name="Rectangle 13"/>
+          <p:cNvSpPr/>
+          <p:nvPr/>
+        </p:nvSpPr>
+        <p:spPr bwMode="auto">
+          <a:xfrm>
+            <a:off x="6370344" y="4357687"/>
+            <a:ext cx="1820665" cy="1128714"/>
+          </a:xfrm>
+          <a:prstGeom prst="rect">
+            <a:avLst/>
+          </a:prstGeom>
+          <a:ln>
+            <a:headEnd/>
+            <a:tailEnd/>
+          </a:ln>
+        </p:spPr>
+        <p:style>
+          <a:lnRef idx="2">
+            <a:schemeClr val="accent1">
+              <a:shade val="50000"/>
+            </a:schemeClr>
+          </a:lnRef>
+          <a:fillRef idx="1">
+            <a:schemeClr val="accent1"/>
+          </a:fillRef>
+          <a:effectRef idx="0">
+            <a:schemeClr val="accent1"/>
+          </a:effectRef>
+          <a:fontRef idx="minor">
+            <a:schemeClr val="lt1"/>
+          </a:fontRef>
+        </p:style>
+        <p:txBody>
+          <a:bodyPr wrap="none" rtlCol="0" anchor="ctr"/>
+          <a:lstStyle/>
+          <a:p>
+            <a:pPr algn="ctr"/>
+            <a:r>
+              <a:rPr lang="en-US" sz="1400" dirty="0">
+                <a:latin typeface="Tekton Pro" pitchFamily="34" charset="0"/>
+              </a:rPr>
+              <a:t>HTTP/1.0 200 OK</a:t>
+            </a:r>
+          </a:p>
+          <a:p>
+            <a:pPr algn="ctr"/>
+            <a:r>
+              <a:rPr lang="en-US" sz="1400" dirty="0">
+                <a:latin typeface="Tekton Pro" pitchFamily="34" charset="0"/>
+              </a:rPr>
+              <a:t>&lt;html&gt;</a:t>
+            </a:r>
+          </a:p>
+          <a:p>
+            <a:pPr algn="ctr"/>
+            <a:r>
+              <a:rPr lang="en-US" sz="1400" dirty="0">
+                <a:latin typeface="Tekton Pro" pitchFamily="34" charset="0"/>
+              </a:rPr>
+              <a:t>….</a:t>
+            </a:r>
+          </a:p>
+          <a:p>
+            <a:pPr algn="ctr"/>
+            <a:r>
+              <a:rPr lang="en-US" sz="1400" dirty="0">
+                <a:latin typeface="Tekton Pro" pitchFamily="34" charset="0"/>
+              </a:rPr>
+              <a:t>&lt;/html&gt;</a:t>
+            </a:r>
+          </a:p>
+        </p:txBody>
+      </p:sp>
+      <p:sp>
+        <p:nvSpPr>
+          <p:cNvPr id="15" name="Rectangle 14"/>
+          <p:cNvSpPr/>
+          <p:nvPr/>
+        </p:nvSpPr>
+        <p:spPr bwMode="auto">
+          <a:xfrm>
+            <a:off x="3665244" y="4367212"/>
+            <a:ext cx="1820665" cy="1128714"/>
+          </a:xfrm>
+          <a:prstGeom prst="rect">
+            <a:avLst/>
+          </a:prstGeom>
+          <a:ln>
+            <a:headEnd/>
+            <a:tailEnd/>
+          </a:ln>
+        </p:spPr>
+        <p:style>
+          <a:lnRef idx="2">
+            <a:schemeClr val="accent1">
+              <a:shade val="50000"/>
+            </a:schemeClr>
+          </a:lnRef>
+          <a:fillRef idx="1">
+            <a:schemeClr val="accent1"/>
+          </a:fillRef>
+          <a:effectRef idx="0">
+            <a:schemeClr val="accent1"/>
+          </a:effectRef>
+          <a:fontRef idx="minor">
+            <a:schemeClr val="lt1"/>
+          </a:fontRef>
+        </p:style>
+        <p:txBody>
+          <a:bodyPr wrap="none" rtlCol="0" anchor="ctr"/>
+          <a:lstStyle/>
+          <a:p>
+            <a:pPr algn="ctr"/>
+            <a:r>
+              <a:rPr lang="en-US" sz="1400" dirty="0">
+                <a:latin typeface="Tekton Pro" pitchFamily="34" charset="0"/>
+              </a:rPr>
+              <a:t>HTTP/1.0 200 OK</a:t>
+            </a:r>
+          </a:p>
+          <a:p>
+            <a:pPr algn="ctr"/>
+            <a:r>
+              <a:rPr lang="en-US" sz="1400" dirty="0">
+                <a:latin typeface="Tekton Pro" pitchFamily="34" charset="0"/>
+              </a:rPr>
+              <a:t>&lt;html&gt;</a:t>
+            </a:r>
+          </a:p>
+          <a:p>
+            <a:pPr algn="ctr"/>
+            <a:r>
+              <a:rPr lang="en-US" sz="1400" dirty="0">
+                <a:latin typeface="Tekton Pro" pitchFamily="34" charset="0"/>
+              </a:rPr>
+              <a:t>….</a:t>
+            </a:r>
+          </a:p>
+          <a:p>
+            <a:pPr algn="ctr"/>
+            <a:r>
+              <a:rPr lang="en-US" sz="1400" dirty="0">
+                <a:latin typeface="Tekton Pro" pitchFamily="34" charset="0"/>
+              </a:rPr>
+              <a:t>&lt;/html&gt;</a:t>
+            </a:r>
+          </a:p>
+        </p:txBody>
+      </p:sp>
+      <p:sp>
+        <p:nvSpPr>
+          <p:cNvPr id="16" name="Rectangle 15"/>
+          <p:cNvSpPr/>
+          <p:nvPr/>
+        </p:nvSpPr>
+        <p:spPr bwMode="auto">
+          <a:xfrm>
+            <a:off x="931167" y="4348162"/>
+            <a:ext cx="1820665" cy="1128714"/>
+          </a:xfrm>
+          <a:prstGeom prst="rect">
+            <a:avLst/>
+          </a:prstGeom>
+          <a:ln>
+            <a:headEnd/>
+            <a:tailEnd/>
+          </a:ln>
+        </p:spPr>
+        <p:style>
+          <a:lnRef idx="2">
+            <a:schemeClr val="accent1">
+              <a:shade val="50000"/>
+            </a:schemeClr>
+          </a:lnRef>
+          <a:fillRef idx="1">
+            <a:schemeClr val="accent1"/>
+          </a:fillRef>
+          <a:effectRef idx="0">
+            <a:schemeClr val="accent1"/>
+          </a:effectRef>
+          <a:fontRef idx="minor">
+            <a:schemeClr val="lt1"/>
+          </a:fontRef>
+        </p:style>
+        <p:txBody>
+          <a:bodyPr wrap="none" rtlCol="0" anchor="ctr"/>
+          <a:lstStyle/>
+          <a:p>
+            <a:pPr algn="ctr"/>
+            <a:r>
+              <a:rPr lang="en-US" sz="1400" dirty="0">
+                <a:latin typeface="Tekton Pro" pitchFamily="34" charset="0"/>
+              </a:rPr>
+              <a:t>HTTP/1.0 200 OK</a:t>
+            </a:r>
+          </a:p>
+          <a:p>
+            <a:pPr algn="ctr"/>
+            <a:r>
+              <a:rPr lang="en-US" sz="1400" dirty="0">
+                <a:latin typeface="Tekton Pro" pitchFamily="34" charset="0"/>
+              </a:rPr>
+              <a:t>&lt;html&gt;</a:t>
+            </a:r>
+          </a:p>
+          <a:p>
+            <a:pPr algn="ctr"/>
+            <a:r>
+              <a:rPr lang="en-US" sz="1400" dirty="0">
+                <a:latin typeface="Tekton Pro" pitchFamily="34" charset="0"/>
+              </a:rPr>
+              <a:t>….</a:t>
+            </a:r>
+          </a:p>
+          <a:p>
+            <a:pPr algn="ctr"/>
+            <a:r>
+              <a:rPr lang="en-US" sz="1400" dirty="0">
+                <a:latin typeface="Tekton Pro" pitchFamily="34" charset="0"/>
+              </a:rPr>
+              <a:t>&lt;/html&gt;</a:t>
+            </a:r>
+          </a:p>
+        </p:txBody>
+      </p:sp>
+    </p:spTree>
+    <p:extLst>
+      <p:ext uri="{BB962C8B-B14F-4D97-AF65-F5344CB8AC3E}">
+        <p14:creationId xmlns:p14="http://schemas.microsoft.com/office/powerpoint/2010/main" val="1471707818"/>
+      </p:ext>
+    </p:extLst>
+  </p:cSld>
+  <p:clrMapOvr>
+    <a:masterClrMapping/>
+  </p:clrMapOvr>
+  <p:transition>
+    <p:fade/>
+  </p:transition>
+  <p:timing>
+    <p:tnLst>
+      <p:par>
+        <p:cTn id="1" dur="indefinite" restart="never" nodeType="tmRoot">
+          <p:childTnLst>
+            <p:seq concurrent="1" nextAc="seek">
+              <p:cTn id="2" dur="indefinite" nodeType="mainSeq">
+                <p:childTnLst>
+                  <p:par>
+                    <p:cTn id="3" fill="hold">
+                      <p:stCondLst>
+                        <p:cond delay="indefinite"/>
+                      </p:stCondLst>
+                      <p:childTnLst>
+                        <p:par>
+                          <p:cTn id="4" fill="hold">
+                            <p:stCondLst>
+                              <p:cond delay="0"/>
+                            </p:stCondLst>
+                            <p:childTnLst>
+                              <p:par>
+                                <p:cTn id="5" presetID="10" presetClass="entr" presetSubtype="0" fill="hold" grpId="0" nodeType="clickEffect">
+                                  <p:stCondLst>
+                                    <p:cond delay="0"/>
+                                  </p:stCondLst>
+                                  <p:childTnLst>
+                                    <p:set>
+                                      <p:cBhvr>
+                                        <p:cTn id="6" dur="1" fill="hold">
+                                          <p:stCondLst>
+                                            <p:cond delay="0"/>
+                                          </p:stCondLst>
+                                        </p:cTn>
+                                        <p:tgtEl>
+                                          <p:spTgt spid="11"/>
+                                        </p:tgtEl>
+                                        <p:attrNameLst>
+                                          <p:attrName>style.visibility</p:attrName>
+                                        </p:attrNameLst>
+                                      </p:cBhvr>
+                                      <p:to>
+                                        <p:strVal val="visible"/>
+                                      </p:to>
+                                    </p:set>
+                                    <p:animEffect transition="in" filter="fade">
+                                      <p:cBhvr>
+                                        <p:cTn id="7" dur="500"/>
+                                        <p:tgtEl>
+                                          <p:spTgt spid="11"/>
+                                        </p:tgtEl>
+                                      </p:cBhvr>
+                                    </p:animEffect>
+                                  </p:childTnLst>
+                                </p:cTn>
+                              </p:par>
+                            </p:childTnLst>
+                          </p:cTn>
+                        </p:par>
+                      </p:childTnLst>
+                    </p:cTn>
+                  </p:par>
+                  <p:par>
+                    <p:cTn id="8" fill="hold">
+                      <p:stCondLst>
+                        <p:cond delay="indefinite"/>
+                      </p:stCondLst>
+                      <p:childTnLst>
+                        <p:par>
+                          <p:cTn id="9" fill="hold">
+                            <p:stCondLst>
+                              <p:cond delay="0"/>
+                            </p:stCondLst>
+                            <p:childTnLst>
+                              <p:par>
+                                <p:cTn id="10" presetID="10" presetClass="entr" presetSubtype="0" fill="hold" grpId="0" nodeType="clickEffect">
+                                  <p:stCondLst>
+                                    <p:cond delay="0"/>
+                                  </p:stCondLst>
+                                  <p:childTnLst>
+                                    <p:set>
+                                      <p:cBhvr>
+                                        <p:cTn id="11" dur="1" fill="hold">
+                                          <p:stCondLst>
+                                            <p:cond delay="0"/>
+                                          </p:stCondLst>
+                                        </p:cTn>
+                                        <p:tgtEl>
+                                          <p:spTgt spid="7"/>
+                                        </p:tgtEl>
+                                        <p:attrNameLst>
+                                          <p:attrName>style.visibility</p:attrName>
+                                        </p:attrNameLst>
+                                      </p:cBhvr>
+                                      <p:to>
+                                        <p:strVal val="visible"/>
+                                      </p:to>
+                                    </p:set>
+                                    <p:animEffect transition="in" filter="fade">
+                                      <p:cBhvr>
+                                        <p:cTn id="12" dur="500"/>
+                                        <p:tgtEl>
+                                          <p:spTgt spid="7"/>
+                                        </p:tgtEl>
+                                      </p:cBhvr>
+                                    </p:animEffect>
+                                  </p:childTnLst>
+                                </p:cTn>
+                              </p:par>
+                            </p:childTnLst>
+                          </p:cTn>
+                        </p:par>
+                      </p:childTnLst>
+                    </p:cTn>
+                  </p:par>
+                  <p:par>
+                    <p:cTn id="13" fill="hold">
+                      <p:stCondLst>
+                        <p:cond delay="indefinite"/>
+                      </p:stCondLst>
+                      <p:childTnLst>
+                        <p:par>
+                          <p:cTn id="14" fill="hold">
+                            <p:stCondLst>
+                              <p:cond delay="0"/>
+                            </p:stCondLst>
+                            <p:childTnLst>
+                              <p:par>
+                                <p:cTn id="15" presetID="10" presetClass="entr" presetSubtype="0" fill="hold" grpId="0" nodeType="clickEffect">
+                                  <p:stCondLst>
+                                    <p:cond delay="0"/>
+                                  </p:stCondLst>
+                                  <p:childTnLst>
+                                    <p:set>
+                                      <p:cBhvr>
+                                        <p:cTn id="16" dur="1" fill="hold">
+                                          <p:stCondLst>
+                                            <p:cond delay="0"/>
+                                          </p:stCondLst>
+                                        </p:cTn>
+                                        <p:tgtEl>
+                                          <p:spTgt spid="12"/>
+                                        </p:tgtEl>
+                                        <p:attrNameLst>
+                                          <p:attrName>style.visibility</p:attrName>
+                                        </p:attrNameLst>
+                                      </p:cBhvr>
+                                      <p:to>
+                                        <p:strVal val="visible"/>
+                                      </p:to>
+                                    </p:set>
+                                    <p:animEffect transition="in" filter="fade">
+                                      <p:cBhvr>
+                                        <p:cTn id="17" dur="500"/>
+                                        <p:tgtEl>
+                                          <p:spTgt spid="12"/>
+                                        </p:tgtEl>
+                                      </p:cBhvr>
+                                    </p:animEffect>
+                                  </p:childTnLst>
+                                </p:cTn>
+                              </p:par>
+                            </p:childTnLst>
+                          </p:cTn>
+                        </p:par>
+                      </p:childTnLst>
+                    </p:cTn>
+                  </p:par>
+                  <p:par>
+                    <p:cTn id="18" fill="hold">
+                      <p:stCondLst>
+                        <p:cond delay="indefinite"/>
+                      </p:stCondLst>
+                      <p:childTnLst>
+                        <p:par>
+                          <p:cTn id="19" fill="hold">
+                            <p:stCondLst>
+                              <p:cond delay="0"/>
+                            </p:stCondLst>
+                            <p:childTnLst>
+                              <p:par>
+                                <p:cTn id="20" presetID="10" presetClass="entr" presetSubtype="0" fill="hold" grpId="0" nodeType="clickEffect">
+                                  <p:stCondLst>
+                                    <p:cond delay="0"/>
+                                  </p:stCondLst>
+                                  <p:childTnLst>
+                                    <p:set>
+                                      <p:cBhvr>
+                                        <p:cTn id="21" dur="1" fill="hold">
+                                          <p:stCondLst>
+                                            <p:cond delay="0"/>
+                                          </p:stCondLst>
+                                        </p:cTn>
+                                        <p:tgtEl>
+                                          <p:spTgt spid="8"/>
+                                        </p:tgtEl>
+                                        <p:attrNameLst>
+                                          <p:attrName>style.visibility</p:attrName>
+                                        </p:attrNameLst>
+                                      </p:cBhvr>
+                                      <p:to>
+                                        <p:strVal val="visible"/>
+                                      </p:to>
+                                    </p:set>
+                                    <p:animEffect transition="in" filter="fade">
+                                      <p:cBhvr>
+                                        <p:cTn id="22" dur="500"/>
+                                        <p:tgtEl>
+                                          <p:spTgt spid="8"/>
+                                        </p:tgtEl>
+                                      </p:cBhvr>
+                                    </p:animEffect>
+                                  </p:childTnLst>
+                                </p:cTn>
+                              </p:par>
+                            </p:childTnLst>
+                          </p:cTn>
+                        </p:par>
+                      </p:childTnLst>
+                    </p:cTn>
+                  </p:par>
+                  <p:par>
+                    <p:cTn id="23" fill="hold">
+                      <p:stCondLst>
+                        <p:cond delay="indefinite"/>
+                      </p:stCondLst>
+                      <p:childTnLst>
+                        <p:par>
+                          <p:cTn id="24" fill="hold">
+                            <p:stCondLst>
+                              <p:cond delay="0"/>
+                            </p:stCondLst>
+                            <p:childTnLst>
+                              <p:par>
+                                <p:cTn id="25" presetID="10" presetClass="entr" presetSubtype="0" fill="hold" grpId="0" nodeType="clickEffect">
+                                  <p:stCondLst>
+                                    <p:cond delay="0"/>
+                                  </p:stCondLst>
+                                  <p:childTnLst>
+                                    <p:set>
+                                      <p:cBhvr>
+                                        <p:cTn id="26" dur="1" fill="hold">
+                                          <p:stCondLst>
+                                            <p:cond delay="0"/>
+                                          </p:stCondLst>
+                                        </p:cTn>
+                                        <p:tgtEl>
+                                          <p:spTgt spid="13"/>
+                                        </p:tgtEl>
+                                        <p:attrNameLst>
+                                          <p:attrName>style.visibility</p:attrName>
+                                        </p:attrNameLst>
+                                      </p:cBhvr>
+                                      <p:to>
+                                        <p:strVal val="visible"/>
+                                      </p:to>
+                                    </p:set>
+                                    <p:animEffect transition="in" filter="fade">
+                                      <p:cBhvr>
+                                        <p:cTn id="27" dur="500"/>
+                                        <p:tgtEl>
+                                          <p:spTgt spid="13"/>
+                                        </p:tgtEl>
+                                      </p:cBhvr>
+                                    </p:animEffect>
+                                  </p:childTnLst>
+                                </p:cTn>
+                              </p:par>
+                            </p:childTnLst>
+                          </p:cTn>
+                        </p:par>
+                      </p:childTnLst>
+                    </p:cTn>
+                  </p:par>
+                  <p:par>
+                    <p:cTn id="28" fill="hold">
+                      <p:stCondLst>
+                        <p:cond delay="indefinite"/>
+                      </p:stCondLst>
+                      <p:childTnLst>
+                        <p:par>
+                          <p:cTn id="29" fill="hold">
+                            <p:stCondLst>
+                              <p:cond delay="0"/>
+                            </p:stCondLst>
+                            <p:childTnLst>
+                              <p:par>
+                                <p:cTn id="30" presetID="10" presetClass="entr" presetSubtype="0" fill="hold" grpId="0" nodeType="clickEffect">
+                                  <p:stCondLst>
+                                    <p:cond delay="0"/>
+                                  </p:stCondLst>
+                                  <p:childTnLst>
+                                    <p:set>
+                                      <p:cBhvr>
+                                        <p:cTn id="31" dur="1" fill="hold">
+                                          <p:stCondLst>
+                                            <p:cond delay="0"/>
+                                          </p:stCondLst>
+                                        </p:cTn>
+                                        <p:tgtEl>
+                                          <p:spTgt spid="14"/>
+                                        </p:tgtEl>
+                                        <p:attrNameLst>
+                                          <p:attrName>style.visibility</p:attrName>
+                                        </p:attrNameLst>
+                                      </p:cBhvr>
+                                      <p:to>
+                                        <p:strVal val="visible"/>
+                                      </p:to>
+                                    </p:set>
+                                    <p:animEffect transition="in" filter="fade">
+                                      <p:cBhvr>
+                                        <p:cTn id="32" dur="500"/>
+                                        <p:tgtEl>
+                                          <p:spTgt spid="14"/>
+                                        </p:tgtEl>
+                                      </p:cBhvr>
+                                    </p:animEffect>
+                                  </p:childTnLst>
+                                </p:cTn>
+                              </p:par>
+                            </p:childTnLst>
+                          </p:cTn>
+                        </p:par>
+                      </p:childTnLst>
+                    </p:cTn>
+                  </p:par>
+                  <p:par>
+                    <p:cTn id="33" fill="hold">
+                      <p:stCondLst>
+                        <p:cond delay="indefinite"/>
+                      </p:stCondLst>
+                      <p:childTnLst>
+                        <p:par>
+                          <p:cTn id="34" fill="hold">
+                            <p:stCondLst>
+                              <p:cond delay="0"/>
+                            </p:stCondLst>
+                            <p:childTnLst>
+                              <p:par>
+                                <p:cTn id="35" presetID="10" presetClass="entr" presetSubtype="0" fill="hold" grpId="0" nodeType="clickEffect">
+                                  <p:stCondLst>
+                                    <p:cond delay="0"/>
+                                  </p:stCondLst>
+                                  <p:childTnLst>
+                                    <p:set>
+                                      <p:cBhvr>
+                                        <p:cTn id="36" dur="1" fill="hold">
+                                          <p:stCondLst>
+                                            <p:cond delay="0"/>
+                                          </p:stCondLst>
+                                        </p:cTn>
+                                        <p:tgtEl>
+                                          <p:spTgt spid="9"/>
+                                        </p:tgtEl>
+                                        <p:attrNameLst>
+                                          <p:attrName>style.visibility</p:attrName>
+                                        </p:attrNameLst>
+                                      </p:cBhvr>
+                                      <p:to>
+                                        <p:strVal val="visible"/>
+                                      </p:to>
+                                    </p:set>
+                                    <p:animEffect transition="in" filter="fade">
+                                      <p:cBhvr>
+                                        <p:cTn id="37" dur="500"/>
+                                        <p:tgtEl>
+                                          <p:spTgt spid="9"/>
+                                        </p:tgtEl>
+                                      </p:cBhvr>
+                                    </p:animEffect>
+                                  </p:childTnLst>
+                                </p:cTn>
+                              </p:par>
+                            </p:childTnLst>
+                          </p:cTn>
+                        </p:par>
+                      </p:childTnLst>
+                    </p:cTn>
+                  </p:par>
+                  <p:par>
+                    <p:cTn id="38" fill="hold">
+                      <p:stCondLst>
+                        <p:cond delay="indefinite"/>
+                      </p:stCondLst>
+                      <p:childTnLst>
+                        <p:par>
+                          <p:cTn id="39" fill="hold">
+                            <p:stCondLst>
+                              <p:cond delay="0"/>
+                            </p:stCondLst>
+                            <p:childTnLst>
+                              <p:par>
+                                <p:cTn id="40" presetID="10" presetClass="entr" presetSubtype="0" fill="hold" grpId="0" nodeType="clickEffect">
+                                  <p:stCondLst>
+                                    <p:cond delay="0"/>
+                                  </p:stCondLst>
+                                  <p:childTnLst>
+                                    <p:set>
+                                      <p:cBhvr>
+                                        <p:cTn id="41" dur="1" fill="hold">
+                                          <p:stCondLst>
+                                            <p:cond delay="0"/>
+                                          </p:stCondLst>
+                                        </p:cTn>
+                                        <p:tgtEl>
+                                          <p:spTgt spid="15"/>
+                                        </p:tgtEl>
+                                        <p:attrNameLst>
+                                          <p:attrName>style.visibility</p:attrName>
+                                        </p:attrNameLst>
+                                      </p:cBhvr>
+                                      <p:to>
+                                        <p:strVal val="visible"/>
+                                      </p:to>
+                                    </p:set>
+                                    <p:animEffect transition="in" filter="fade">
+                                      <p:cBhvr>
+                                        <p:cTn id="42" dur="500"/>
+                                        <p:tgtEl>
+                                          <p:spTgt spid="15"/>
+                                        </p:tgtEl>
+                                      </p:cBhvr>
+                                    </p:animEffect>
+                                  </p:childTnLst>
+                                </p:cTn>
+                              </p:par>
+                            </p:childTnLst>
+                          </p:cTn>
+                        </p:par>
+                      </p:childTnLst>
+                    </p:cTn>
+                  </p:par>
+                  <p:par>
+                    <p:cTn id="43" fill="hold">
+                      <p:stCondLst>
+                        <p:cond delay="indefinite"/>
+                      </p:stCondLst>
+                      <p:childTnLst>
+                        <p:par>
+                          <p:cTn id="44" fill="hold">
+                            <p:stCondLst>
+                              <p:cond delay="0"/>
+                            </p:stCondLst>
+                            <p:childTnLst>
+                              <p:par>
+                                <p:cTn id="45" presetID="10" presetClass="entr" presetSubtype="0" fill="hold" grpId="0" nodeType="clickEffect">
+                                  <p:stCondLst>
+                                    <p:cond delay="0"/>
+                                  </p:stCondLst>
+                                  <p:childTnLst>
+                                    <p:set>
+                                      <p:cBhvr>
+                                        <p:cTn id="46" dur="1" fill="hold">
+                                          <p:stCondLst>
+                                            <p:cond delay="0"/>
+                                          </p:stCondLst>
+                                        </p:cTn>
+                                        <p:tgtEl>
+                                          <p:spTgt spid="10"/>
+                                        </p:tgtEl>
+                                        <p:attrNameLst>
+                                          <p:attrName>style.visibility</p:attrName>
+                                        </p:attrNameLst>
+                                      </p:cBhvr>
+                                      <p:to>
+                                        <p:strVal val="visible"/>
+                                      </p:to>
+                                    </p:set>
+                                    <p:animEffect transition="in" filter="fade">
+                                      <p:cBhvr>
+                                        <p:cTn id="47" dur="500"/>
+                                        <p:tgtEl>
+                                          <p:spTgt spid="10"/>
+                                        </p:tgtEl>
+                                      </p:cBhvr>
+                                    </p:animEffect>
+                                  </p:childTnLst>
+                                </p:cTn>
+                              </p:par>
+                            </p:childTnLst>
+                          </p:cTn>
+                        </p:par>
+                      </p:childTnLst>
+                    </p:cTn>
+                  </p:par>
+                  <p:par>
+                    <p:cTn id="48" fill="hold">
+                      <p:stCondLst>
+                        <p:cond delay="indefinite"/>
+                      </p:stCondLst>
+                      <p:childTnLst>
+                        <p:par>
+                          <p:cTn id="49" fill="hold">
+                            <p:stCondLst>
+                              <p:cond delay="0"/>
+                            </p:stCondLst>
+                            <p:childTnLst>
+                              <p:par>
+                                <p:cTn id="50" presetID="10" presetClass="entr" presetSubtype="0" fill="hold" grpId="0" nodeType="clickEffect">
+                                  <p:stCondLst>
+                                    <p:cond delay="0"/>
+                                  </p:stCondLst>
+                                  <p:childTnLst>
+                                    <p:set>
+                                      <p:cBhvr>
+                                        <p:cTn id="51" dur="1" fill="hold">
+                                          <p:stCondLst>
+                                            <p:cond delay="0"/>
+                                          </p:stCondLst>
+                                        </p:cTn>
+                                        <p:tgtEl>
+                                          <p:spTgt spid="16"/>
+                                        </p:tgtEl>
+                                        <p:attrNameLst>
+                                          <p:attrName>style.visibility</p:attrName>
+                                        </p:attrNameLst>
+                                      </p:cBhvr>
+                                      <p:to>
+                                        <p:strVal val="visible"/>
+                                      </p:to>
+                                    </p:set>
+                                    <p:animEffect transition="in" filter="fade">
+                                      <p:cBhvr>
+                                        <p:cTn id="52" dur="500"/>
+                                        <p:tgtEl>
+                                          <p:spTgt spid="16"/>
+                                        </p:tgtEl>
+                                      </p:cBhvr>
+                                    </p:animEffect>
+                                  </p:childTnLst>
+                                </p:cTn>
+                              </p:par>
+                            </p:childTnLst>
+                          </p:cTn>
+                        </p:par>
+                      </p:childTnLst>
+                    </p:cTn>
+                  </p:par>
+                </p:childTnLst>
+              </p:cTn>
+              <p:prevCondLst>
+                <p:cond evt="onPrev" delay="0">
+                  <p:tgtEl>
+                    <p:sldTgt/>
+                  </p:tgtEl>
+                </p:cond>
+              </p:prevCondLst>
+              <p:nextCondLst>
+                <p:cond evt="onNext" delay="0">
+                  <p:tgtEl>
+                    <p:sldTgt/>
+                  </p:tgtEl>
+                </p:cond>
+              </p:nextCondLst>
+            </p:seq>
+          </p:childTnLst>
+        </p:cTn>
+      </p:par>
+    </p:tnLst>
+    <p:bldLst>
+      <p:bldP spid="7" grpId="0" animBg="1"/>
+      <p:bldP spid="8" grpId="0" animBg="1"/>
+      <p:bldP spid="9" grpId="0" animBg="1"/>
+      <p:bldP spid="10" grpId="0" animBg="1"/>
+      <p:bldP spid="11" grpId="0" animBg="1"/>
+      <p:bldP spid="12" grpId="0" animBg="1"/>
+      <p:bldP spid="13" grpId="0" animBg="1"/>
+      <p:bldP spid="14" grpId="0" animBg="1"/>
+      <p:bldP spid="15" grpId="0" animBg="1"/>
+      <p:bldP spid="16" grpId="0" animBg="1"/>
+    </p:bldLst>
+  </p:timing>
+</p:sld>
+</file>
+
+<file path=ppt/slides/slide16.xml><?xml version="1.0" encoding="utf-8"?>
+<p:sld xmlns:a="http://schemas.openxmlformats.org/drawingml/2006/main" xmlns:r="http://schemas.openxmlformats.org/officeDocument/2006/relationships" xmlns:p="http://schemas.openxmlformats.org/presentationml/2006/main">
+  <p:cSld>
+    <p:spTree>
+      <p:nvGrpSpPr>
+        <p:cNvPr id="1" name=""/>
+        <p:cNvGrpSpPr/>
+        <p:nvPr/>
+      </p:nvGrpSpPr>
+      <p:grpSpPr>
+        <a:xfrm>
+          <a:off x="0" y="0"/>
+          <a:ext cx="0" cy="0"/>
+          <a:chOff x="0" y="0"/>
+          <a:chExt cx="0" cy="0"/>
+        </a:xfrm>
+      </p:grpSpPr>
+      <p:sp>
+        <p:nvSpPr>
+          <p:cNvPr id="2" name="Title 1"/>
+          <p:cNvSpPr>
+            <a:spLocks noGrp="1"/>
+          </p:cNvSpPr>
+          <p:nvPr>
+            <p:ph type="title"/>
+          </p:nvPr>
+        </p:nvSpPr>
+        <p:spPr/>
+        <p:txBody>
+          <a:bodyPr/>
+          <a:lstStyle/>
           <a:p>
             <a:r>
               <a:rPr lang="en-US" dirty="0"/>
-              <a:t>Based on OWIN</a:t>
+              <a:t>MVC Framework</a:t>
+            </a:r>
+          </a:p>
+        </p:txBody>
+      </p:sp>
+      <p:sp>
+        <p:nvSpPr>
+          <p:cNvPr id="3" name="Text Placeholder 2"/>
+          <p:cNvSpPr>
+            <a:spLocks noGrp="1"/>
+          </p:cNvSpPr>
+          <p:nvPr>
+            <p:ph type="body" idx="1"/>
+          </p:nvPr>
+        </p:nvSpPr>
+        <p:spPr/>
+        <p:txBody>
+          <a:bodyPr/>
+          <a:lstStyle/>
+          <a:p>
+            <a:r>
+              <a:rPr lang="en-US" dirty="0"/>
+              <a:t>Includes both HTML and API features</a:t>
             </a:r>
           </a:p>
         </p:txBody>
       </p:sp>
       <p:pic>
         <p:nvPicPr>
-          <p:cNvPr id="3074" name="Picture 2" descr="../_images/request-delegate-pipeline.png"/>
+          <p:cNvPr id="4" name="Picture 3"/>
+          <p:cNvPicPr>
+            <a:picLocks noChangeAspect="1"/>
+          </p:cNvPicPr>
+          <p:nvPr/>
+        </p:nvPicPr>
+        <p:blipFill>
+          <a:blip r:embed="rId2"/>
+          <a:stretch>
+            <a:fillRect/>
+          </a:stretch>
+        </p:blipFill>
+        <p:spPr>
+          <a:xfrm>
+            <a:off x="457200" y="2082145"/>
+            <a:ext cx="8162925" cy="4229100"/>
+          </a:xfrm>
+          <a:prstGeom prst="rect">
+            <a:avLst/>
+          </a:prstGeom>
+        </p:spPr>
+      </p:pic>
+    </p:spTree>
+    <p:extLst>
+      <p:ext uri="{BB962C8B-B14F-4D97-AF65-F5344CB8AC3E}">
+        <p14:creationId xmlns:p14="http://schemas.microsoft.com/office/powerpoint/2010/main" val="1766268052"/>
+      </p:ext>
+    </p:extLst>
+  </p:cSld>
+  <p:clrMapOvr>
+    <a:masterClrMapping/>
+  </p:clrMapOvr>
+  <p:transition>
+    <p:fade/>
+  </p:transition>
+</p:sld>
+</file>
+
+<file path=ppt/slides/slide17.xml><?xml version="1.0" encoding="utf-8"?>
+<p:sld xmlns:a="http://schemas.openxmlformats.org/drawingml/2006/main" xmlns:r="http://schemas.openxmlformats.org/officeDocument/2006/relationships" xmlns:p="http://schemas.openxmlformats.org/presentationml/2006/main">
+  <p:cSld>
+    <p:spTree>
+      <p:nvGrpSpPr>
+        <p:cNvPr id="1" name=""/>
+        <p:cNvGrpSpPr/>
+        <p:nvPr/>
+      </p:nvGrpSpPr>
+      <p:grpSpPr>
+        <a:xfrm>
+          <a:off x="0" y="0"/>
+          <a:ext cx="0" cy="0"/>
+          <a:chOff x="0" y="0"/>
+          <a:chExt cx="0" cy="0"/>
+        </a:xfrm>
+      </p:grpSpPr>
+      <p:sp>
+        <p:nvSpPr>
+          <p:cNvPr id="2" name="Title 1"/>
+          <p:cNvSpPr>
+            <a:spLocks noGrp="1"/>
+          </p:cNvSpPr>
+          <p:nvPr>
+            <p:ph type="title"/>
+          </p:nvPr>
+        </p:nvSpPr>
+        <p:spPr/>
+        <p:txBody>
+          <a:bodyPr/>
+          <a:lstStyle/>
+          <a:p>
+            <a:r>
+              <a:rPr lang="en-US" dirty="0"/>
+              <a:t>Razor Views</a:t>
+            </a:r>
+          </a:p>
+        </p:txBody>
+      </p:sp>
+      <p:sp>
+        <p:nvSpPr>
+          <p:cNvPr id="3" name="Text Placeholder 2"/>
+          <p:cNvSpPr>
+            <a:spLocks noGrp="1"/>
+          </p:cNvSpPr>
+          <p:nvPr>
+            <p:ph type="body" idx="1"/>
+          </p:nvPr>
+        </p:nvSpPr>
+        <p:spPr/>
+        <p:txBody>
+          <a:bodyPr/>
+          <a:lstStyle/>
+          <a:p>
+            <a:endParaRPr lang="en-US" dirty="0"/>
+          </a:p>
+        </p:txBody>
+      </p:sp>
+      <p:pic>
+        <p:nvPicPr>
+          <p:cNvPr id="4" name="Picture 3"/>
+          <p:cNvPicPr>
+            <a:picLocks noChangeAspect="1"/>
+          </p:cNvPicPr>
+          <p:nvPr/>
+        </p:nvPicPr>
+        <p:blipFill>
+          <a:blip r:embed="rId2"/>
+          <a:stretch>
+            <a:fillRect/>
+          </a:stretch>
+        </p:blipFill>
+        <p:spPr>
+          <a:xfrm>
+            <a:off x="466725" y="1219200"/>
+            <a:ext cx="8220075" cy="4820919"/>
+          </a:xfrm>
+          <a:prstGeom prst="rect">
+            <a:avLst/>
+          </a:prstGeom>
+        </p:spPr>
+      </p:pic>
+    </p:spTree>
+    <p:extLst>
+      <p:ext uri="{BB962C8B-B14F-4D97-AF65-F5344CB8AC3E}">
+        <p14:creationId xmlns:p14="http://schemas.microsoft.com/office/powerpoint/2010/main" val="1169428176"/>
+      </p:ext>
+    </p:extLst>
+  </p:cSld>
+  <p:clrMapOvr>
+    <a:masterClrMapping/>
+  </p:clrMapOvr>
+  <p:transition>
+    <p:fade/>
+  </p:transition>
+</p:sld>
+</file>
+
+<file path=ppt/slides/slide18.xml><?xml version="1.0" encoding="utf-8"?>
+<p:sld xmlns:a="http://schemas.openxmlformats.org/drawingml/2006/main" xmlns:r="http://schemas.openxmlformats.org/officeDocument/2006/relationships" xmlns:p="http://schemas.openxmlformats.org/presentationml/2006/main">
+  <p:cSld>
+    <p:spTree>
+      <p:nvGrpSpPr>
+        <p:cNvPr id="1" name=""/>
+        <p:cNvGrpSpPr/>
+        <p:nvPr/>
+      </p:nvGrpSpPr>
+      <p:grpSpPr>
+        <a:xfrm>
+          <a:off x="0" y="0"/>
+          <a:ext cx="0" cy="0"/>
+          <a:chOff x="0" y="0"/>
+          <a:chExt cx="0" cy="0"/>
+        </a:xfrm>
+      </p:grpSpPr>
+      <p:sp>
+        <p:nvSpPr>
+          <p:cNvPr id="2" name="Title 1"/>
+          <p:cNvSpPr>
+            <a:spLocks noGrp="1"/>
+          </p:cNvSpPr>
+          <p:nvPr>
+            <p:ph type="title"/>
+          </p:nvPr>
+        </p:nvSpPr>
+        <p:spPr/>
+        <p:txBody>
+          <a:bodyPr/>
+          <a:lstStyle/>
+          <a:p>
+            <a:r>
+              <a:rPr lang="en-US" dirty="0"/>
+              <a:t>Hosting</a:t>
+            </a:r>
+          </a:p>
+        </p:txBody>
+      </p:sp>
+      <p:sp>
+        <p:nvSpPr>
+          <p:cNvPr id="3" name="Text Placeholder 2"/>
+          <p:cNvSpPr>
+            <a:spLocks noGrp="1"/>
+          </p:cNvSpPr>
+          <p:nvPr>
+            <p:ph type="body" idx="1"/>
+          </p:nvPr>
+        </p:nvSpPr>
+        <p:spPr/>
+        <p:txBody>
+          <a:bodyPr/>
+          <a:lstStyle/>
+          <a:p>
+            <a:r>
+              <a:rPr lang="en-US" dirty="0"/>
+              <a:t>IIS / </a:t>
+            </a:r>
+            <a:r>
+              <a:rPr lang="en-US"/>
+              <a:t>IIS Express</a:t>
+            </a:r>
+            <a:endParaRPr lang="en-US" dirty="0"/>
+          </a:p>
+          <a:p>
+            <a:r>
+              <a:rPr lang="en-US" dirty="0"/>
+              <a:t>Kestrel</a:t>
+            </a:r>
+          </a:p>
+        </p:txBody>
+      </p:sp>
+      <p:pic>
+        <p:nvPicPr>
+          <p:cNvPr id="4098" name="Picture 2" descr="http://4.bp.blogspot.com/-X7CrLfzmTBQ/VB9_rUA0ubI/AAAAAAAACIA/7WXMI4by-F0/s1600/IIS%2B8.png"/>
           <p:cNvPicPr>
             <a:picLocks noChangeAspect="1" noChangeArrowheads="1"/>
           </p:cNvPicPr>
@@ -4686,22 +5725,13 @@
         </p:blipFill>
         <p:spPr bwMode="auto">
           <a:xfrm>
-            <a:off x="1981200" y="2590800"/>
-            <a:ext cx="4953000" cy="3169920"/>
+            <a:off x="2286000" y="2667000"/>
+            <a:ext cx="6210300" cy="2724151"/>
           </a:xfrm>
           <a:prstGeom prst="rect">
             <a:avLst/>
           </a:prstGeom>
-          <a:ln>
-            <a:noFill/>
-          </a:ln>
-          <a:effectLst>
-            <a:outerShdw blurRad="292100" dist="139700" dir="2700000" algn="tl" rotWithShape="0">
-              <a:srgbClr val="333333">
-                <a:alpha val="65000"/>
-              </a:srgbClr>
-            </a:outerShdw>
-          </a:effectLst>
+          <a:noFill/>
           <a:extLst>
             <a:ext uri="{909E8E84-426E-40DD-AFC4-6F175D3DCCD1}">
               <a14:hiddenFill xmlns:a14="http://schemas.microsoft.com/office/drawing/2010/main">
@@ -4716,7 +5746,176 @@
     </p:spTree>
     <p:extLst>
       <p:ext uri="{BB962C8B-B14F-4D97-AF65-F5344CB8AC3E}">
-        <p14:creationId xmlns:p14="http://schemas.microsoft.com/office/powerpoint/2010/main" val="1471707818"/>
+        <p14:creationId xmlns:p14="http://schemas.microsoft.com/office/powerpoint/2010/main" val="2984317155"/>
+      </p:ext>
+    </p:extLst>
+  </p:cSld>
+  <p:clrMapOvr>
+    <a:masterClrMapping/>
+  </p:clrMapOvr>
+  <p:transition>
+    <p:fade/>
+  </p:transition>
+</p:sld>
+</file>
+
+<file path=ppt/slides/slide19.xml><?xml version="1.0" encoding="utf-8"?>
+<p:sld xmlns:a="http://schemas.openxmlformats.org/drawingml/2006/main" xmlns:r="http://schemas.openxmlformats.org/officeDocument/2006/relationships" xmlns:p="http://schemas.openxmlformats.org/presentationml/2006/main">
+  <p:cSld>
+    <p:spTree>
+      <p:nvGrpSpPr>
+        <p:cNvPr id="1" name=""/>
+        <p:cNvGrpSpPr/>
+        <p:nvPr/>
+      </p:nvGrpSpPr>
+      <p:grpSpPr>
+        <a:xfrm>
+          <a:off x="0" y="0"/>
+          <a:ext cx="0" cy="0"/>
+          <a:chOff x="0" y="0"/>
+          <a:chExt cx="0" cy="0"/>
+        </a:xfrm>
+      </p:grpSpPr>
+      <p:sp>
+        <p:nvSpPr>
+          <p:cNvPr id="2" name="Title 1"/>
+          <p:cNvSpPr>
+            <a:spLocks noGrp="1"/>
+          </p:cNvSpPr>
+          <p:nvPr>
+            <p:ph type="title"/>
+          </p:nvPr>
+        </p:nvSpPr>
+        <p:spPr/>
+        <p:txBody>
+          <a:bodyPr/>
+          <a:lstStyle/>
+          <a:p>
+            <a:r>
+              <a:rPr lang="en-US" dirty="0"/>
+              <a:t>Summary</a:t>
+            </a:r>
+          </a:p>
+        </p:txBody>
+      </p:sp>
+      <p:sp>
+        <p:nvSpPr>
+          <p:cNvPr id="3" name="Text Placeholder 2"/>
+          <p:cNvSpPr>
+            <a:spLocks noGrp="1"/>
+          </p:cNvSpPr>
+          <p:nvPr>
+            <p:ph type="body" idx="1"/>
+          </p:nvPr>
+        </p:nvSpPr>
+        <p:spPr/>
+        <p:txBody>
+          <a:bodyPr/>
+          <a:lstStyle/>
+          <a:p>
+            <a:pPr lvl="1"/>
+            <a:endParaRPr lang="en-US" dirty="0"/>
+          </a:p>
+        </p:txBody>
+      </p:sp>
+      <p:sp>
+        <p:nvSpPr>
+          <p:cNvPr id="4" name="Rectangle 3"/>
+          <p:cNvSpPr/>
+          <p:nvPr/>
+        </p:nvSpPr>
+        <p:spPr bwMode="auto">
+          <a:xfrm>
+            <a:off x="304800" y="2209800"/>
+            <a:ext cx="4114800" cy="2743200"/>
+          </a:xfrm>
+          <a:prstGeom prst="rect">
+            <a:avLst/>
+          </a:prstGeom>
+          <a:solidFill>
+            <a:srgbClr val="D3D3A9"/>
+          </a:solidFill>
+          <a:ln w="9525" algn="ctr">
+            <a:solidFill>
+              <a:schemeClr val="tx1"/>
+            </a:solidFill>
+            <a:miter lim="800000"/>
+            <a:headEnd/>
+            <a:tailEnd/>
+          </a:ln>
+          <a:effectLst>
+            <a:outerShdw blurRad="50800" dist="38100" dir="2700000" algn="tl" rotWithShape="0">
+              <a:prstClr val="black">
+                <a:alpha val="40000"/>
+              </a:prstClr>
+            </a:outerShdw>
+          </a:effectLst>
+        </p:spPr>
+        <p:txBody>
+          <a:bodyPr wrap="none" rtlCol="0" anchor="ctr"/>
+          <a:lstStyle/>
+          <a:p>
+            <a:pPr algn="ctr"/>
+            <a:r>
+              <a:rPr lang="en-US" sz="2000" dirty="0">
+                <a:latin typeface="Tekton Pro" pitchFamily="34" charset="0"/>
+              </a:rPr>
+              <a:t>ASP.NET MVC</a:t>
+            </a:r>
+          </a:p>
+        </p:txBody>
+      </p:sp>
+      <p:sp>
+        <p:nvSpPr>
+          <p:cNvPr id="5" name="Rectangle 4"/>
+          <p:cNvSpPr/>
+          <p:nvPr/>
+        </p:nvSpPr>
+        <p:spPr bwMode="auto">
+          <a:xfrm>
+            <a:off x="4659984" y="2209800"/>
+            <a:ext cx="4114800" cy="2743200"/>
+          </a:xfrm>
+          <a:prstGeom prst="rect">
+            <a:avLst/>
+          </a:prstGeom>
+          <a:solidFill>
+            <a:srgbClr val="D3D3A9"/>
+          </a:solidFill>
+          <a:ln w="9525" algn="ctr">
+            <a:solidFill>
+              <a:schemeClr val="tx1"/>
+            </a:solidFill>
+            <a:miter lim="800000"/>
+            <a:headEnd/>
+            <a:tailEnd/>
+          </a:ln>
+          <a:effectLst>
+            <a:outerShdw blurRad="50800" dist="38100" dir="2700000" algn="tl" rotWithShape="0">
+              <a:prstClr val="black">
+                <a:alpha val="40000"/>
+              </a:prstClr>
+            </a:outerShdw>
+          </a:effectLst>
+        </p:spPr>
+        <p:txBody>
+          <a:bodyPr wrap="none" rtlCol="0" anchor="ctr"/>
+          <a:lstStyle/>
+          <a:p>
+            <a:pPr algn="ctr"/>
+            <a:r>
+              <a:rPr lang="en-US" sz="2000" dirty="0">
+                <a:latin typeface="Tekton Pro" pitchFamily="34" charset="0"/>
+              </a:rPr>
+              <a:t>Middleware</a:t>
+            </a:r>
+          </a:p>
+        </p:txBody>
+      </p:sp>
+    </p:spTree>
+    <p:extLst>
+      <p:ext uri="{BB962C8B-B14F-4D97-AF65-F5344CB8AC3E}">
+        <p14:creationId xmlns:p14="http://schemas.microsoft.com/office/powerpoint/2010/main" val="3947626774"/>
       </p:ext>
     </p:extLst>
   </p:cSld>
@@ -5336,503 +6535,6 @@
 </p:sld>
 </file>
 
-<file path=ppt/slides/slide20.xml><?xml version="1.0" encoding="utf-8"?>
-<p:sld xmlns:a="http://schemas.openxmlformats.org/drawingml/2006/main" xmlns:r="http://schemas.openxmlformats.org/officeDocument/2006/relationships" xmlns:p="http://schemas.openxmlformats.org/presentationml/2006/main">
-  <p:cSld>
-    <p:spTree>
-      <p:nvGrpSpPr>
-        <p:cNvPr id="1" name=""/>
-        <p:cNvGrpSpPr/>
-        <p:nvPr/>
-      </p:nvGrpSpPr>
-      <p:grpSpPr>
-        <a:xfrm>
-          <a:off x="0" y="0"/>
-          <a:ext cx="0" cy="0"/>
-          <a:chOff x="0" y="0"/>
-          <a:chExt cx="0" cy="0"/>
-        </a:xfrm>
-      </p:grpSpPr>
-      <p:sp>
-        <p:nvSpPr>
-          <p:cNvPr id="2" name="Title 1"/>
-          <p:cNvSpPr>
-            <a:spLocks noGrp="1"/>
-          </p:cNvSpPr>
-          <p:nvPr>
-            <p:ph type="title"/>
-          </p:nvPr>
-        </p:nvSpPr>
-        <p:spPr/>
-        <p:txBody>
-          <a:bodyPr/>
-          <a:lstStyle/>
-          <a:p>
-            <a:r>
-              <a:rPr lang="en-US" dirty="0"/>
-              <a:t>MVC Framework</a:t>
-            </a:r>
-          </a:p>
-        </p:txBody>
-      </p:sp>
-      <p:sp>
-        <p:nvSpPr>
-          <p:cNvPr id="3" name="Text Placeholder 2"/>
-          <p:cNvSpPr>
-            <a:spLocks noGrp="1"/>
-          </p:cNvSpPr>
-          <p:nvPr>
-            <p:ph type="body" idx="1"/>
-          </p:nvPr>
-        </p:nvSpPr>
-        <p:spPr/>
-        <p:txBody>
-          <a:bodyPr/>
-          <a:lstStyle/>
-          <a:p>
-            <a:r>
-              <a:rPr lang="en-US" dirty="0"/>
-              <a:t>Includes both HTML and API features</a:t>
-            </a:r>
-          </a:p>
-        </p:txBody>
-      </p:sp>
-      <p:pic>
-        <p:nvPicPr>
-          <p:cNvPr id="4" name="Picture 3"/>
-          <p:cNvPicPr>
-            <a:picLocks noChangeAspect="1"/>
-          </p:cNvPicPr>
-          <p:nvPr/>
-        </p:nvPicPr>
-        <p:blipFill>
-          <a:blip r:embed="rId2"/>
-          <a:stretch>
-            <a:fillRect/>
-          </a:stretch>
-        </p:blipFill>
-        <p:spPr>
-          <a:xfrm>
-            <a:off x="457200" y="2082145"/>
-            <a:ext cx="8162925" cy="4229100"/>
-          </a:xfrm>
-          <a:prstGeom prst="rect">
-            <a:avLst/>
-          </a:prstGeom>
-        </p:spPr>
-      </p:pic>
-    </p:spTree>
-    <p:extLst>
-      <p:ext uri="{BB962C8B-B14F-4D97-AF65-F5344CB8AC3E}">
-        <p14:creationId xmlns:p14="http://schemas.microsoft.com/office/powerpoint/2010/main" val="1766268052"/>
-      </p:ext>
-    </p:extLst>
-  </p:cSld>
-  <p:clrMapOvr>
-    <a:masterClrMapping/>
-  </p:clrMapOvr>
-  <p:transition>
-    <p:fade/>
-  </p:transition>
-</p:sld>
-</file>
-
-<file path=ppt/slides/slide21.xml><?xml version="1.0" encoding="utf-8"?>
-<p:sld xmlns:a="http://schemas.openxmlformats.org/drawingml/2006/main" xmlns:r="http://schemas.openxmlformats.org/officeDocument/2006/relationships" xmlns:p="http://schemas.openxmlformats.org/presentationml/2006/main">
-  <p:cSld>
-    <p:spTree>
-      <p:nvGrpSpPr>
-        <p:cNvPr id="1" name=""/>
-        <p:cNvGrpSpPr/>
-        <p:nvPr/>
-      </p:nvGrpSpPr>
-      <p:grpSpPr>
-        <a:xfrm>
-          <a:off x="0" y="0"/>
-          <a:ext cx="0" cy="0"/>
-          <a:chOff x="0" y="0"/>
-          <a:chExt cx="0" cy="0"/>
-        </a:xfrm>
-      </p:grpSpPr>
-      <p:sp>
-        <p:nvSpPr>
-          <p:cNvPr id="2" name="Title 1"/>
-          <p:cNvSpPr>
-            <a:spLocks noGrp="1"/>
-          </p:cNvSpPr>
-          <p:nvPr>
-            <p:ph type="title"/>
-          </p:nvPr>
-        </p:nvSpPr>
-        <p:spPr/>
-        <p:txBody>
-          <a:bodyPr/>
-          <a:lstStyle/>
-          <a:p>
-            <a:r>
-              <a:rPr lang="en-US" dirty="0"/>
-              <a:t>Razor Views</a:t>
-            </a:r>
-          </a:p>
-        </p:txBody>
-      </p:sp>
-      <p:sp>
-        <p:nvSpPr>
-          <p:cNvPr id="3" name="Text Placeholder 2"/>
-          <p:cNvSpPr>
-            <a:spLocks noGrp="1"/>
-          </p:cNvSpPr>
-          <p:nvPr>
-            <p:ph type="body" idx="1"/>
-          </p:nvPr>
-        </p:nvSpPr>
-        <p:spPr/>
-        <p:txBody>
-          <a:bodyPr/>
-          <a:lstStyle/>
-          <a:p>
-            <a:endParaRPr lang="en-US" dirty="0"/>
-          </a:p>
-        </p:txBody>
-      </p:sp>
-      <p:pic>
-        <p:nvPicPr>
-          <p:cNvPr id="4" name="Picture 3"/>
-          <p:cNvPicPr>
-            <a:picLocks noChangeAspect="1"/>
-          </p:cNvPicPr>
-          <p:nvPr/>
-        </p:nvPicPr>
-        <p:blipFill>
-          <a:blip r:embed="rId2"/>
-          <a:stretch>
-            <a:fillRect/>
-          </a:stretch>
-        </p:blipFill>
-        <p:spPr>
-          <a:xfrm>
-            <a:off x="466725" y="1219200"/>
-            <a:ext cx="8220075" cy="4820919"/>
-          </a:xfrm>
-          <a:prstGeom prst="rect">
-            <a:avLst/>
-          </a:prstGeom>
-        </p:spPr>
-      </p:pic>
-    </p:spTree>
-    <p:extLst>
-      <p:ext uri="{BB962C8B-B14F-4D97-AF65-F5344CB8AC3E}">
-        <p14:creationId xmlns:p14="http://schemas.microsoft.com/office/powerpoint/2010/main" val="1169428176"/>
-      </p:ext>
-    </p:extLst>
-  </p:cSld>
-  <p:clrMapOvr>
-    <a:masterClrMapping/>
-  </p:clrMapOvr>
-  <p:transition>
-    <p:fade/>
-  </p:transition>
-</p:sld>
-</file>
-
-<file path=ppt/slides/slide22.xml><?xml version="1.0" encoding="utf-8"?>
-<p:sld xmlns:a="http://schemas.openxmlformats.org/drawingml/2006/main" xmlns:r="http://schemas.openxmlformats.org/officeDocument/2006/relationships" xmlns:p="http://schemas.openxmlformats.org/presentationml/2006/main">
-  <p:cSld>
-    <p:spTree>
-      <p:nvGrpSpPr>
-        <p:cNvPr id="1" name=""/>
-        <p:cNvGrpSpPr/>
-        <p:nvPr/>
-      </p:nvGrpSpPr>
-      <p:grpSpPr>
-        <a:xfrm>
-          <a:off x="0" y="0"/>
-          <a:ext cx="0" cy="0"/>
-          <a:chOff x="0" y="0"/>
-          <a:chExt cx="0" cy="0"/>
-        </a:xfrm>
-      </p:grpSpPr>
-      <p:sp>
-        <p:nvSpPr>
-          <p:cNvPr id="2" name="Title 1"/>
-          <p:cNvSpPr>
-            <a:spLocks noGrp="1"/>
-          </p:cNvSpPr>
-          <p:nvPr>
-            <p:ph type="title"/>
-          </p:nvPr>
-        </p:nvSpPr>
-        <p:spPr/>
-        <p:txBody>
-          <a:bodyPr/>
-          <a:lstStyle/>
-          <a:p>
-            <a:r>
-              <a:rPr lang="en-US" dirty="0"/>
-              <a:t>Hosting</a:t>
-            </a:r>
-          </a:p>
-        </p:txBody>
-      </p:sp>
-      <p:sp>
-        <p:nvSpPr>
-          <p:cNvPr id="3" name="Text Placeholder 2"/>
-          <p:cNvSpPr>
-            <a:spLocks noGrp="1"/>
-          </p:cNvSpPr>
-          <p:nvPr>
-            <p:ph type="body" idx="1"/>
-          </p:nvPr>
-        </p:nvSpPr>
-        <p:spPr/>
-        <p:txBody>
-          <a:bodyPr/>
-          <a:lstStyle/>
-          <a:p>
-            <a:r>
-              <a:rPr lang="en-US" dirty="0"/>
-              <a:t>IIS / </a:t>
-            </a:r>
-            <a:r>
-              <a:rPr lang="en-US"/>
-              <a:t>IIS Express</a:t>
-            </a:r>
-            <a:endParaRPr lang="en-US" dirty="0"/>
-          </a:p>
-          <a:p>
-            <a:r>
-              <a:rPr lang="en-US" dirty="0"/>
-              <a:t>Kestrel</a:t>
-            </a:r>
-          </a:p>
-        </p:txBody>
-      </p:sp>
-      <p:pic>
-        <p:nvPicPr>
-          <p:cNvPr id="4098" name="Picture 2" descr="http://4.bp.blogspot.com/-X7CrLfzmTBQ/VB9_rUA0ubI/AAAAAAAACIA/7WXMI4by-F0/s1600/IIS%2B8.png"/>
-          <p:cNvPicPr>
-            <a:picLocks noChangeAspect="1" noChangeArrowheads="1"/>
-          </p:cNvPicPr>
-          <p:nvPr/>
-        </p:nvPicPr>
-        <p:blipFill>
-          <a:blip r:embed="rId2">
-            <a:extLst>
-              <a:ext uri="{28A0092B-C50C-407E-A947-70E740481C1C}">
-                <a14:useLocalDpi xmlns:a14="http://schemas.microsoft.com/office/drawing/2010/main" val="0"/>
-              </a:ext>
-            </a:extLst>
-          </a:blip>
-          <a:srcRect/>
-          <a:stretch>
-            <a:fillRect/>
-          </a:stretch>
-        </p:blipFill>
-        <p:spPr bwMode="auto">
-          <a:xfrm>
-            <a:off x="2286000" y="2667000"/>
-            <a:ext cx="6210300" cy="2724151"/>
-          </a:xfrm>
-          <a:prstGeom prst="rect">
-            <a:avLst/>
-          </a:prstGeom>
-          <a:noFill/>
-          <a:extLst>
-            <a:ext uri="{909E8E84-426E-40DD-AFC4-6F175D3DCCD1}">
-              <a14:hiddenFill xmlns:a14="http://schemas.microsoft.com/office/drawing/2010/main">
-                <a:solidFill>
-                  <a:srgbClr val="FFFFFF"/>
-                </a:solidFill>
-              </a14:hiddenFill>
-            </a:ext>
-          </a:extLst>
-        </p:spPr>
-      </p:pic>
-    </p:spTree>
-    <p:extLst>
-      <p:ext uri="{BB962C8B-B14F-4D97-AF65-F5344CB8AC3E}">
-        <p14:creationId xmlns:p14="http://schemas.microsoft.com/office/powerpoint/2010/main" val="2984317155"/>
-      </p:ext>
-    </p:extLst>
-  </p:cSld>
-  <p:clrMapOvr>
-    <a:masterClrMapping/>
-  </p:clrMapOvr>
-  <p:transition>
-    <p:fade/>
-  </p:transition>
-</p:sld>
-</file>
-
-<file path=ppt/slides/slide23.xml><?xml version="1.0" encoding="utf-8"?>
-<p:sld xmlns:a="http://schemas.openxmlformats.org/drawingml/2006/main" xmlns:r="http://schemas.openxmlformats.org/officeDocument/2006/relationships" xmlns:p="http://schemas.openxmlformats.org/presentationml/2006/main">
-  <p:cSld>
-    <p:spTree>
-      <p:nvGrpSpPr>
-        <p:cNvPr id="1" name=""/>
-        <p:cNvGrpSpPr/>
-        <p:nvPr/>
-      </p:nvGrpSpPr>
-      <p:grpSpPr>
-        <a:xfrm>
-          <a:off x="0" y="0"/>
-          <a:ext cx="0" cy="0"/>
-          <a:chOff x="0" y="0"/>
-          <a:chExt cx="0" cy="0"/>
-        </a:xfrm>
-      </p:grpSpPr>
-      <p:sp>
-        <p:nvSpPr>
-          <p:cNvPr id="2" name="Title 1"/>
-          <p:cNvSpPr>
-            <a:spLocks noGrp="1"/>
-          </p:cNvSpPr>
-          <p:nvPr>
-            <p:ph type="title"/>
-          </p:nvPr>
-        </p:nvSpPr>
-        <p:spPr/>
-        <p:txBody>
-          <a:bodyPr/>
-          <a:lstStyle/>
-          <a:p>
-            <a:r>
-              <a:rPr lang="en-US" dirty="0"/>
-              <a:t>Summary</a:t>
-            </a:r>
-          </a:p>
-        </p:txBody>
-      </p:sp>
-      <p:sp>
-        <p:nvSpPr>
-          <p:cNvPr id="3" name="Text Placeholder 2"/>
-          <p:cNvSpPr>
-            <a:spLocks noGrp="1"/>
-          </p:cNvSpPr>
-          <p:nvPr>
-            <p:ph type="body" idx="1"/>
-          </p:nvPr>
-        </p:nvSpPr>
-        <p:spPr/>
-        <p:txBody>
-          <a:bodyPr/>
-          <a:lstStyle/>
-          <a:p>
-            <a:pPr lvl="1"/>
-            <a:endParaRPr lang="en-US" dirty="0"/>
-          </a:p>
-        </p:txBody>
-      </p:sp>
-      <p:sp>
-        <p:nvSpPr>
-          <p:cNvPr id="4" name="Rectangle 3"/>
-          <p:cNvSpPr/>
-          <p:nvPr/>
-        </p:nvSpPr>
-        <p:spPr bwMode="auto">
-          <a:xfrm>
-            <a:off x="304800" y="2209800"/>
-            <a:ext cx="4114800" cy="2743200"/>
-          </a:xfrm>
-          <a:prstGeom prst="rect">
-            <a:avLst/>
-          </a:prstGeom>
-          <a:solidFill>
-            <a:srgbClr val="D3D3A9"/>
-          </a:solidFill>
-          <a:ln w="9525" algn="ctr">
-            <a:solidFill>
-              <a:schemeClr val="tx1"/>
-            </a:solidFill>
-            <a:miter lim="800000"/>
-            <a:headEnd/>
-            <a:tailEnd/>
-          </a:ln>
-          <a:effectLst>
-            <a:outerShdw blurRad="50800" dist="38100" dir="2700000" algn="tl" rotWithShape="0">
-              <a:prstClr val="black">
-                <a:alpha val="40000"/>
-              </a:prstClr>
-            </a:outerShdw>
-          </a:effectLst>
-        </p:spPr>
-        <p:txBody>
-          <a:bodyPr wrap="none" rtlCol="0" anchor="ctr"/>
-          <a:lstStyle/>
-          <a:p>
-            <a:pPr algn="ctr"/>
-            <a:r>
-              <a:rPr lang="en-US" sz="2000" dirty="0">
-                <a:latin typeface="Tekton Pro" pitchFamily="34" charset="0"/>
-              </a:rPr>
-              <a:t>ASP.NET MVC</a:t>
-            </a:r>
-          </a:p>
-        </p:txBody>
-      </p:sp>
-      <p:sp>
-        <p:nvSpPr>
-          <p:cNvPr id="5" name="Rectangle 4"/>
-          <p:cNvSpPr/>
-          <p:nvPr/>
-        </p:nvSpPr>
-        <p:spPr bwMode="auto">
-          <a:xfrm>
-            <a:off x="4659984" y="2209800"/>
-            <a:ext cx="4114800" cy="2743200"/>
-          </a:xfrm>
-          <a:prstGeom prst="rect">
-            <a:avLst/>
-          </a:prstGeom>
-          <a:solidFill>
-            <a:srgbClr val="D3D3A9"/>
-          </a:solidFill>
-          <a:ln w="9525" algn="ctr">
-            <a:solidFill>
-              <a:schemeClr val="tx1"/>
-            </a:solidFill>
-            <a:miter lim="800000"/>
-            <a:headEnd/>
-            <a:tailEnd/>
-          </a:ln>
-          <a:effectLst>
-            <a:outerShdw blurRad="50800" dist="38100" dir="2700000" algn="tl" rotWithShape="0">
-              <a:prstClr val="black">
-                <a:alpha val="40000"/>
-              </a:prstClr>
-            </a:outerShdw>
-          </a:effectLst>
-        </p:spPr>
-        <p:txBody>
-          <a:bodyPr wrap="none" rtlCol="0" anchor="ctr"/>
-          <a:lstStyle/>
-          <a:p>
-            <a:pPr algn="ctr"/>
-            <a:r>
-              <a:rPr lang="en-US" sz="2000" dirty="0">
-                <a:latin typeface="Tekton Pro" pitchFamily="34" charset="0"/>
-              </a:rPr>
-              <a:t>Middleware</a:t>
-            </a:r>
-          </a:p>
-        </p:txBody>
-      </p:sp>
-    </p:spTree>
-    <p:extLst>
-      <p:ext uri="{BB962C8B-B14F-4D97-AF65-F5344CB8AC3E}">
-        <p14:creationId xmlns:p14="http://schemas.microsoft.com/office/powerpoint/2010/main" val="3947626774"/>
-      </p:ext>
-    </p:extLst>
-  </p:cSld>
-  <p:clrMapOvr>
-    <a:masterClrMapping/>
-  </p:clrMapOvr>
-  <p:transition>
-    <p:fade/>
-  </p:transition>
-</p:sld>
-</file>
-
 <file path=ppt/slides/slide3.xml><?xml version="1.0" encoding="utf-8"?>
 <p:sld xmlns:a="http://schemas.openxmlformats.org/drawingml/2006/main" xmlns:r="http://schemas.openxmlformats.org/officeDocument/2006/relationships" xmlns:p="http://schemas.openxmlformats.org/presentationml/2006/main">
   <p:cSld>
@@ -5866,8 +6568,8 @@
           <a:lstStyle/>
           <a:p>
             <a:r>
-              <a:rPr lang="en-US"/>
-              <a:t>.NET 2015</a:t>
+              <a:rPr lang="en-US" dirty="0"/>
+              <a:t>.NET 2016</a:t>
             </a:r>
           </a:p>
         </p:txBody>
@@ -5893,43 +6595,26 @@
       </p:sp>
       <p:pic>
         <p:nvPicPr>
-          <p:cNvPr id="1026" name="Picture 2" descr="http://lh4.ggpht.com/-Fwh9Xzv9xdA/VO5a8HdR5wI/AAAAAAAAVq8/LanpNEIejVI/image_thumb.png?imgmax=800"/>
+          <p:cNvPr id="4" name="Picture 3"/>
           <p:cNvPicPr>
-            <a:picLocks noChangeAspect="1" noChangeArrowheads="1"/>
+            <a:picLocks noChangeAspect="1"/>
           </p:cNvPicPr>
           <p:nvPr/>
         </p:nvPicPr>
         <p:blipFill>
-          <a:blip r:embed="rId2">
-            <a:extLst>
-              <a:ext uri="{28A0092B-C50C-407E-A947-70E740481C1C}">
-                <a14:useLocalDpi xmlns:a14="http://schemas.microsoft.com/office/drawing/2010/main" val="0"/>
-              </a:ext>
-            </a:extLst>
-          </a:blip>
-          <a:srcRect/>
+          <a:blip r:embed="rId2"/>
           <a:stretch>
             <a:fillRect/>
           </a:stretch>
         </p:blipFill>
-        <p:spPr bwMode="auto">
+        <p:spPr>
           <a:xfrm>
-            <a:off x="640437" y="2209800"/>
-            <a:ext cx="7863125" cy="3886200"/>
+            <a:off x="1371600" y="1066800"/>
+            <a:ext cx="6204408" cy="5325908"/>
           </a:xfrm>
           <a:prstGeom prst="rect">
             <a:avLst/>
           </a:prstGeom>
-          <a:noFill/>
-          <a:extLst>
-            <a:ext uri="{909E8E84-426E-40DD-AFC4-6F175D3DCCD1}">
-              <a14:hiddenFill xmlns:a14="http://schemas.microsoft.com/office/drawing/2010/main">
-                <a:solidFill>
-                  <a:srgbClr val="FFFFFF"/>
-                </a:solidFill>
-              </a14:hiddenFill>
-            </a:ext>
-          </a:extLst>
         </p:spPr>
       </p:pic>
     </p:spTree>
@@ -6004,21 +6689,13 @@
           <a:p>
             <a:r>
               <a:rPr lang="en-US" dirty="0"/>
-              <a:t>Install with Visual Studio 2015</a:t>
+              <a:t>Install with Visual Studio</a:t>
             </a:r>
           </a:p>
           <a:p>
             <a:r>
               <a:rPr lang="en-US" dirty="0"/>
-              <a:t>Install using the .NET Version Manager (</a:t>
-            </a:r>
-            <a:r>
-              <a:rPr lang="en-US" dirty="0" err="1"/>
-              <a:t>dnvm</a:t>
-            </a:r>
-            <a:r>
-              <a:rPr lang="en-US" dirty="0"/>
-              <a:t>)</a:t>
+              <a:t>Install using the .NET Core SDK</a:t>
             </a:r>
           </a:p>
         </p:txBody>
@@ -6073,22 +6750,12 @@
         </p:blipFill>
         <p:spPr>
           <a:xfrm>
-            <a:off x="4593076" y="2667000"/>
-            <a:ext cx="3788923" cy="2763646"/>
+            <a:off x="4495800" y="2711993"/>
+            <a:ext cx="4114800" cy="2751106"/>
           </a:xfrm>
           <a:prstGeom prst="rect">
             <a:avLst/>
           </a:prstGeom>
-          <a:ln>
-            <a:noFill/>
-          </a:ln>
-          <a:effectLst>
-            <a:outerShdw blurRad="292100" dist="139700" dir="2700000" algn="tl" rotWithShape="0">
-              <a:srgbClr val="333333">
-                <a:alpha val="65000"/>
-              </a:srgbClr>
-            </a:outerShdw>
-          </a:effectLst>
         </p:spPr>
       </p:pic>
     </p:spTree>
@@ -6163,7 +6830,7 @@
           <a:p>
             <a:r>
               <a:rPr lang="en-US" dirty="0"/>
-              <a:t>Visual Studio offers ASP.NET 5 templates</a:t>
+              <a:t>Visual Studio offers ASP.NET Core templates</a:t>
             </a:r>
           </a:p>
         </p:txBody>
@@ -6256,7 +6923,7 @@
             </a:r>
             <a:r>
               <a:rPr lang="en-US" dirty="0" err="1"/>
-              <a:t>xproj</a:t>
+              <a:t>csproj</a:t>
             </a:r>
             <a:r>
               <a:rPr lang="en-US" dirty="0"/>
@@ -6286,7 +6953,7 @@
             </a:r>
             <a:r>
               <a:rPr lang="en-US" dirty="0" err="1"/>
-              <a:t>xproj</a:t>
+              <a:t>csproj</a:t>
             </a:r>
             <a:r>
               <a:rPr lang="en-US" dirty="0"/>
@@ -6298,13 +6965,6 @@
             <a:r>
               <a:rPr lang="en-US" dirty="0"/>
               <a:t>No individual files</a:t>
-            </a:r>
-          </a:p>
-          <a:p>
-            <a:pPr lvl="1"/>
-            <a:r>
-              <a:rPr lang="en-US" dirty="0"/>
-              <a:t>No assembly references</a:t>
             </a:r>
           </a:p>
           <a:p>
@@ -6563,7 +7223,7 @@
           <a:p>
             <a:r>
               <a:rPr lang="en-US" dirty="0"/>
-              <a:t>Web site is rooted in </a:t>
+              <a:t>Static assets must live in </a:t>
             </a:r>
             <a:r>
               <a:rPr lang="en-US" dirty="0" err="1"/>
@@ -6572,26 +7232,12 @@
             <a:endParaRPr lang="en-US" dirty="0"/>
           </a:p>
           <a:p>
-            <a:pPr lvl="1"/>
             <a:r>
               <a:rPr lang="en-US" dirty="0"/>
-              <a:t>Static assets must live in </a:t>
-            </a:r>
-            <a:r>
-              <a:rPr lang="en-US" dirty="0" err="1"/>
-              <a:t>wwwroot</a:t>
-            </a:r>
-            <a:endParaRPr lang="en-US" dirty="0"/>
-          </a:p>
-          <a:p>
-            <a:r>
-              <a:rPr lang="en-US" dirty="0"/>
-              <a:t>Name is configurable in </a:t>
-            </a:r>
-            <a:r>
-              <a:rPr lang="en-US" dirty="0" err="1"/>
-              <a:t>project.json</a:t>
-            </a:r>
+              <a:t>This behavior is configurable</a:t>
+            </a:r>
+          </a:p>
+          <a:p>
             <a:endParaRPr lang="en-US" dirty="0"/>
           </a:p>
         </p:txBody>
@@ -6612,7 +7258,7 @@
         </p:blipFill>
         <p:spPr>
           <a:xfrm>
-            <a:off x="4542148" y="2805112"/>
+            <a:off x="4419600" y="2362200"/>
             <a:ext cx="3889415" cy="3138488"/>
           </a:xfrm>
           <a:prstGeom prst="rect">

</xml_diff>